<commit_message>
avances en presentación y código ejemplo rminer
</commit_message>
<xml_diff>
--- a/articulo 1 XAI/Apuntes/Sensitivity analysis/Presentación SA.pptx
+++ b/articulo 1 XAI/Apuntes/Sensitivity analysis/Presentación SA.pptx
@@ -5,7 +5,7 @@
     <p:sldMasterId id="2147483660" r:id="rId1"/>
   </p:sldMasterIdLst>
   <p:notesMasterIdLst>
-    <p:notesMasterId r:id="rId29"/>
+    <p:notesMasterId r:id="rId31"/>
   </p:notesMasterIdLst>
   <p:sldIdLst>
     <p:sldId id="303" r:id="rId2"/>
@@ -24,38 +24,40 @@
     <p:sldId id="354" r:id="rId15"/>
     <p:sldId id="280" r:id="rId16"/>
     <p:sldId id="357" r:id="rId17"/>
-    <p:sldId id="353" r:id="rId18"/>
-    <p:sldId id="356" r:id="rId19"/>
-    <p:sldId id="355" r:id="rId20"/>
-    <p:sldId id="306" r:id="rId21"/>
-    <p:sldId id="317" r:id="rId22"/>
-    <p:sldId id="330" r:id="rId23"/>
-    <p:sldId id="343" r:id="rId24"/>
-    <p:sldId id="331" r:id="rId25"/>
-    <p:sldId id="299" r:id="rId26"/>
-    <p:sldId id="300" r:id="rId27"/>
-    <p:sldId id="308" r:id="rId28"/>
+    <p:sldId id="358" r:id="rId18"/>
+    <p:sldId id="359" r:id="rId19"/>
+    <p:sldId id="353" r:id="rId20"/>
+    <p:sldId id="356" r:id="rId21"/>
+    <p:sldId id="355" r:id="rId22"/>
+    <p:sldId id="306" r:id="rId23"/>
+    <p:sldId id="317" r:id="rId24"/>
+    <p:sldId id="330" r:id="rId25"/>
+    <p:sldId id="343" r:id="rId26"/>
+    <p:sldId id="331" r:id="rId27"/>
+    <p:sldId id="299" r:id="rId28"/>
+    <p:sldId id="300" r:id="rId29"/>
+    <p:sldId id="308" r:id="rId30"/>
   </p:sldIdLst>
   <p:sldSz cx="18288000" cy="10288588"/>
   <p:notesSz cx="6858000" cy="9144000"/>
   <p:embeddedFontLst>
     <p:embeddedFont>
       <p:font typeface="Cambria Math" panose="02040503050406030204" pitchFamily="18" charset="0"/>
-      <p:regular r:id="rId30"/>
+      <p:regular r:id="rId32"/>
     </p:embeddedFont>
     <p:embeddedFont>
       <p:font typeface="Candara" panose="020E0502030303020204" pitchFamily="34" charset="0"/>
-      <p:regular r:id="rId31"/>
-      <p:bold r:id="rId32"/>
-      <p:italic r:id="rId33"/>
-      <p:boldItalic r:id="rId34"/>
+      <p:regular r:id="rId33"/>
+      <p:bold r:id="rId34"/>
+      <p:italic r:id="rId35"/>
+      <p:boldItalic r:id="rId36"/>
     </p:embeddedFont>
     <p:embeddedFont>
       <p:font typeface="DIN" panose="020B0604020202020204" charset="0"/>
-      <p:regular r:id="rId35"/>
-      <p:bold r:id="rId36"/>
-      <p:italic r:id="rId37"/>
-      <p:boldItalic r:id="rId38"/>
+      <p:regular r:id="rId37"/>
+      <p:bold r:id="rId38"/>
+      <p:italic r:id="rId39"/>
+      <p:boldItalic r:id="rId40"/>
     </p:embeddedFont>
   </p:embeddedFontLst>
   <p:defaultTextStyle>
@@ -2695,6 +2697,248 @@
 </p:notes>
 </file>
 
+<file path=ppt/notesSlides/notesSlide10.xml><?xml version="1.0" encoding="utf-8"?>
+<p:notes xmlns:a="http://schemas.openxmlformats.org/drawingml/2006/main" xmlns:r="http://schemas.openxmlformats.org/officeDocument/2006/relationships" xmlns:p="http://schemas.openxmlformats.org/presentationml/2006/main">
+  <p:cSld>
+    <p:spTree>
+      <p:nvGrpSpPr>
+        <p:cNvPr id="1" name=""/>
+        <p:cNvGrpSpPr/>
+        <p:nvPr/>
+      </p:nvGrpSpPr>
+      <p:grpSpPr>
+        <a:xfrm>
+          <a:off x="0" y="0"/>
+          <a:ext cx="0" cy="0"/>
+          <a:chOff x="0" y="0"/>
+          <a:chExt cx="0" cy="0"/>
+        </a:xfrm>
+      </p:grpSpPr>
+      <p:sp>
+        <p:nvSpPr>
+          <p:cNvPr id="2" name="Marcador de imagen de diapositiva 1"/>
+          <p:cNvSpPr>
+            <a:spLocks noGrp="1" noRot="1" noChangeAspect="1"/>
+          </p:cNvSpPr>
+          <p:nvPr>
+            <p:ph type="sldImg"/>
+          </p:nvPr>
+        </p:nvSpPr>
+        <p:spPr/>
+      </p:sp>
+      <p:sp>
+        <p:nvSpPr>
+          <p:cNvPr id="3" name="Marcador de notas 2"/>
+          <p:cNvSpPr>
+            <a:spLocks noGrp="1"/>
+          </p:cNvSpPr>
+          <p:nvPr>
+            <p:ph type="body" idx="1"/>
+          </p:nvPr>
+        </p:nvSpPr>
+        <p:spPr/>
+        <p:txBody>
+          <a:bodyPr/>
+          <a:lstStyle/>
+          <a:p>
+            <a:pPr marL="0" marR="0" lvl="0" indent="0" algn="l" defTabSz="1371600" rtl="0" eaLnBrk="1" fontAlgn="auto" latinLnBrk="0" hangingPunct="1">
+              <a:lnSpc>
+                <a:spcPct val="100000"/>
+              </a:lnSpc>
+              <a:spcBef>
+                <a:spcPts val="0"/>
+              </a:spcBef>
+              <a:spcAft>
+                <a:spcPts val="0"/>
+              </a:spcAft>
+              <a:buClrTx/>
+              <a:buSzTx/>
+              <a:buFontTx/>
+              <a:buNone/>
+              <a:tabLst/>
+              <a:defRPr/>
+            </a:pPr>
+            <a:r>
+              <a:rPr lang="es-ES" sz="1800" dirty="0">
+                <a:effectLst/>
+                <a:latin typeface="Calibri" panose="020F0502020204030204" pitchFamily="34" charset="0"/>
+                <a:ea typeface="Calibri" panose="020F0502020204030204" pitchFamily="34" charset="0"/>
+                <a:cs typeface="Times New Roman" panose="02020603050405020304" pitchFamily="18" charset="0"/>
+              </a:rPr>
+              <a:t>En este caso, como hemos dicho, se escoge EAT como modelo, también limitando el número de nodos hoja como se hacía con CART. En este caso, como función de pérdidas se escoge el MSE y, de este modo, al sustituir la función de perdidas en la fórmula de los </a:t>
+            </a:r>
+            <a:r>
+              <a:rPr lang="es-ES" sz="1800" dirty="0" err="1">
+                <a:effectLst/>
+                <a:latin typeface="Calibri" panose="020F0502020204030204" pitchFamily="34" charset="0"/>
+                <a:ea typeface="Calibri" panose="020F0502020204030204" pitchFamily="34" charset="0"/>
+                <a:cs typeface="Times New Roman" panose="02020603050405020304" pitchFamily="18" charset="0"/>
+              </a:rPr>
+              <a:t>pseudo-residuos</a:t>
+            </a:r>
+            <a:r>
+              <a:rPr lang="es-ES" sz="1800" dirty="0">
+                <a:effectLst/>
+                <a:latin typeface="Calibri" panose="020F0502020204030204" pitchFamily="34" charset="0"/>
+                <a:ea typeface="Calibri" panose="020F0502020204030204" pitchFamily="34" charset="0"/>
+                <a:cs typeface="Times New Roman" panose="02020603050405020304" pitchFamily="18" charset="0"/>
+              </a:rPr>
+              <a:t> nos queda que estos son la diferencia entre el valor real y el valor observado. Es importante darse cuenta de que como la función de perdidas va a envolver los datos por arriba, la predicción siempre será mayor o igual que el valor real, por lo que los valores de </a:t>
+            </a:r>
+            <a:r>
+              <a:rPr lang="es-ES" sz="1800" dirty="0" err="1">
+                <a:effectLst/>
+                <a:latin typeface="Calibri" panose="020F0502020204030204" pitchFamily="34" charset="0"/>
+                <a:ea typeface="Calibri" panose="020F0502020204030204" pitchFamily="34" charset="0"/>
+                <a:cs typeface="Times New Roman" panose="02020603050405020304" pitchFamily="18" charset="0"/>
+              </a:rPr>
+              <a:t>pseudo-residuos</a:t>
+            </a:r>
+            <a:r>
+              <a:rPr lang="es-ES" sz="1800" dirty="0">
+                <a:effectLst/>
+                <a:latin typeface="Calibri" panose="020F0502020204030204" pitchFamily="34" charset="0"/>
+                <a:ea typeface="Calibri" panose="020F0502020204030204" pitchFamily="34" charset="0"/>
+                <a:cs typeface="Times New Roman" panose="02020603050405020304" pitchFamily="18" charset="0"/>
+              </a:rPr>
+              <a:t> siempre serán negativos o cero. </a:t>
+            </a:r>
+          </a:p>
+        </p:txBody>
+      </p:sp>
+      <p:sp>
+        <p:nvSpPr>
+          <p:cNvPr id="4" name="Marcador de número de diapositiva 3"/>
+          <p:cNvSpPr>
+            <a:spLocks noGrp="1"/>
+          </p:cNvSpPr>
+          <p:nvPr>
+            <p:ph type="sldNum" sz="quarter" idx="5"/>
+          </p:nvPr>
+        </p:nvSpPr>
+        <p:spPr/>
+        <p:txBody>
+          <a:bodyPr/>
+          <a:lstStyle/>
+          <a:p>
+            <a:fld id="{CA6CDE8D-5C8C-4CEB-8086-70F298F6BBD0}" type="slidenum">
+              <a:rPr lang="es-ES" smtClean="0"/>
+              <a:t>18</a:t>
+            </a:fld>
+            <a:endParaRPr lang="es-ES"/>
+          </a:p>
+        </p:txBody>
+      </p:sp>
+    </p:spTree>
+    <p:extLst>
+      <p:ext uri="{BB962C8B-B14F-4D97-AF65-F5344CB8AC3E}">
+        <p14:creationId xmlns:p14="http://schemas.microsoft.com/office/powerpoint/2010/main" val="1661730322"/>
+      </p:ext>
+    </p:extLst>
+  </p:cSld>
+  <p:clrMapOvr>
+    <a:masterClrMapping/>
+  </p:clrMapOvr>
+</p:notes>
+</file>
+
+<file path=ppt/notesSlides/notesSlide11.xml><?xml version="1.0" encoding="utf-8"?>
+<p:notes xmlns:a="http://schemas.openxmlformats.org/drawingml/2006/main" xmlns:r="http://schemas.openxmlformats.org/officeDocument/2006/relationships" xmlns:p="http://schemas.openxmlformats.org/presentationml/2006/main">
+  <p:cSld>
+    <p:spTree>
+      <p:nvGrpSpPr>
+        <p:cNvPr id="1" name=""/>
+        <p:cNvGrpSpPr/>
+        <p:nvPr/>
+      </p:nvGrpSpPr>
+      <p:grpSpPr>
+        <a:xfrm>
+          <a:off x="0" y="0"/>
+          <a:ext cx="0" cy="0"/>
+          <a:chOff x="0" y="0"/>
+          <a:chExt cx="0" cy="0"/>
+        </a:xfrm>
+      </p:grpSpPr>
+      <p:sp>
+        <p:nvSpPr>
+          <p:cNvPr id="2" name="Marcador de imagen de diapositiva 1"/>
+          <p:cNvSpPr>
+            <a:spLocks noGrp="1" noRot="1" noChangeAspect="1"/>
+          </p:cNvSpPr>
+          <p:nvPr>
+            <p:ph type="sldImg"/>
+          </p:nvPr>
+        </p:nvSpPr>
+        <p:spPr/>
+      </p:sp>
+      <p:sp>
+        <p:nvSpPr>
+          <p:cNvPr id="3" name="Marcador de notas 2"/>
+          <p:cNvSpPr>
+            <a:spLocks noGrp="1"/>
+          </p:cNvSpPr>
+          <p:nvPr>
+            <p:ph type="body" idx="1"/>
+          </p:nvPr>
+        </p:nvSpPr>
+        <p:spPr/>
+        <p:txBody>
+          <a:bodyPr/>
+          <a:lstStyle/>
+          <a:p>
+            <a:pPr algn="just">
+              <a:lnSpc>
+                <a:spcPct val="107000"/>
+              </a:lnSpc>
+              <a:spcAft>
+                <a:spcPts val="800"/>
+              </a:spcAft>
+            </a:pPr>
+            <a:endParaRPr lang="es-ES" sz="1800" dirty="0">
+              <a:effectLst/>
+              <a:latin typeface="Calibri" panose="020F0502020204030204" pitchFamily="34" charset="0"/>
+              <a:ea typeface="Calibri" panose="020F0502020204030204" pitchFamily="34" charset="0"/>
+              <a:cs typeface="Times New Roman" panose="02020603050405020304" pitchFamily="18" charset="0"/>
+            </a:endParaRPr>
+          </a:p>
+        </p:txBody>
+      </p:sp>
+      <p:sp>
+        <p:nvSpPr>
+          <p:cNvPr id="4" name="Marcador de número de diapositiva 3"/>
+          <p:cNvSpPr>
+            <a:spLocks noGrp="1"/>
+          </p:cNvSpPr>
+          <p:nvPr>
+            <p:ph type="sldNum" sz="quarter" idx="5"/>
+          </p:nvPr>
+        </p:nvSpPr>
+        <p:spPr/>
+        <p:txBody>
+          <a:bodyPr/>
+          <a:lstStyle/>
+          <a:p>
+            <a:fld id="{CA6CDE8D-5C8C-4CEB-8086-70F298F6BBD0}" type="slidenum">
+              <a:rPr lang="es-ES" smtClean="0"/>
+              <a:t>28</a:t>
+            </a:fld>
+            <a:endParaRPr lang="es-ES"/>
+          </a:p>
+        </p:txBody>
+      </p:sp>
+    </p:spTree>
+    <p:extLst>
+      <p:ext uri="{BB962C8B-B14F-4D97-AF65-F5344CB8AC3E}">
+        <p14:creationId xmlns:p14="http://schemas.microsoft.com/office/powerpoint/2010/main" val="687364974"/>
+      </p:ext>
+    </p:extLst>
+  </p:cSld>
+  <p:clrMapOvr>
+    <a:masterClrMapping/>
+  </p:clrMapOvr>
+</p:notes>
+</file>
+
 <file path=ppt/notesSlides/notesSlide2.xml><?xml version="1.0" encoding="utf-8"?>
 <p:notes xmlns:a="http://schemas.openxmlformats.org/drawingml/2006/main" xmlns:r="http://schemas.openxmlformats.org/officeDocument/2006/relationships" xmlns:p="http://schemas.openxmlformats.org/presentationml/2006/main">
   <p:cSld>
@@ -3559,20 +3803,68 @@
           <a:bodyPr/>
           <a:lstStyle/>
           <a:p>
-            <a:pPr algn="just">
+            <a:pPr marL="0" marR="0" lvl="0" indent="0" algn="l" defTabSz="1371600" rtl="0" eaLnBrk="1" fontAlgn="auto" latinLnBrk="0" hangingPunct="1">
               <a:lnSpc>
-                <a:spcPct val="107000"/>
+                <a:spcPct val="100000"/>
               </a:lnSpc>
+              <a:spcBef>
+                <a:spcPts val="0"/>
+              </a:spcBef>
               <a:spcAft>
-                <a:spcPts val="800"/>
+                <a:spcPts val="0"/>
               </a:spcAft>
+              <a:buClrTx/>
+              <a:buSzTx/>
+              <a:buFontTx/>
+              <a:buNone/>
+              <a:tabLst/>
+              <a:defRPr/>
             </a:pPr>
-            <a:endParaRPr lang="es-ES" sz="1800" dirty="0">
-              <a:effectLst/>
-              <a:latin typeface="Calibri" panose="020F0502020204030204" pitchFamily="34" charset="0"/>
-              <a:ea typeface="Calibri" panose="020F0502020204030204" pitchFamily="34" charset="0"/>
-              <a:cs typeface="Times New Roman" panose="02020603050405020304" pitchFamily="18" charset="0"/>
-            </a:endParaRPr>
+            <a:r>
+              <a:rPr lang="es-ES" sz="1800" dirty="0">
+                <a:effectLst/>
+                <a:latin typeface="Calibri" panose="020F0502020204030204" pitchFamily="34" charset="0"/>
+                <a:ea typeface="Calibri" panose="020F0502020204030204" pitchFamily="34" charset="0"/>
+                <a:cs typeface="Times New Roman" panose="02020603050405020304" pitchFamily="18" charset="0"/>
+              </a:rPr>
+              <a:t>En este caso, como hemos dicho, se escoge EAT como modelo, también limitando el número de nodos hoja como se hacía con CART. En este caso, como función de pérdidas se escoge el MSE y, de este modo, al sustituir la función de perdidas en la fórmula de los </a:t>
+            </a:r>
+            <a:r>
+              <a:rPr lang="es-ES" sz="1800" dirty="0" err="1">
+                <a:effectLst/>
+                <a:latin typeface="Calibri" panose="020F0502020204030204" pitchFamily="34" charset="0"/>
+                <a:ea typeface="Calibri" panose="020F0502020204030204" pitchFamily="34" charset="0"/>
+                <a:cs typeface="Times New Roman" panose="02020603050405020304" pitchFamily="18" charset="0"/>
+              </a:rPr>
+              <a:t>pseudo-residuos</a:t>
+            </a:r>
+            <a:r>
+              <a:rPr lang="es-ES" sz="1800" dirty="0">
+                <a:effectLst/>
+                <a:latin typeface="Calibri" panose="020F0502020204030204" pitchFamily="34" charset="0"/>
+                <a:ea typeface="Calibri" panose="020F0502020204030204" pitchFamily="34" charset="0"/>
+                <a:cs typeface="Times New Roman" panose="02020603050405020304" pitchFamily="18" charset="0"/>
+              </a:rPr>
+              <a:t> nos queda que estos son la diferencia entre el valor real y el valor observado. Es importante darse cuenta de que como la función de perdidas va a envolver los datos por arriba, la predicción siempre será mayor o igual que el valor real, por lo que los valores de </a:t>
+            </a:r>
+            <a:r>
+              <a:rPr lang="es-ES" sz="1800" dirty="0" err="1">
+                <a:effectLst/>
+                <a:latin typeface="Calibri" panose="020F0502020204030204" pitchFamily="34" charset="0"/>
+                <a:ea typeface="Calibri" panose="020F0502020204030204" pitchFamily="34" charset="0"/>
+                <a:cs typeface="Times New Roman" panose="02020603050405020304" pitchFamily="18" charset="0"/>
+              </a:rPr>
+              <a:t>pseudo-residuos</a:t>
+            </a:r>
+            <a:r>
+              <a:rPr lang="es-ES" sz="1800" dirty="0">
+                <a:effectLst/>
+                <a:latin typeface="Calibri" panose="020F0502020204030204" pitchFamily="34" charset="0"/>
+                <a:ea typeface="Calibri" panose="020F0502020204030204" pitchFamily="34" charset="0"/>
+                <a:cs typeface="Times New Roman" panose="02020603050405020304" pitchFamily="18" charset="0"/>
+              </a:rPr>
+              <a:t> siempre serán negativos o cero. </a:t>
+            </a:r>
           </a:p>
         </p:txBody>
       </p:sp>
@@ -3593,7 +3885,7 @@
           <a:p>
             <a:fld id="{CA6CDE8D-5C8C-4CEB-8086-70F298F6BBD0}" type="slidenum">
               <a:rPr lang="es-ES" smtClean="0"/>
-              <a:t>26</a:t>
+              <a:t>17</a:t>
             </a:fld>
             <a:endParaRPr lang="es-ES"/>
           </a:p>
@@ -3602,7 +3894,7 @@
     </p:spTree>
     <p:extLst>
       <p:ext uri="{BB962C8B-B14F-4D97-AF65-F5344CB8AC3E}">
-        <p14:creationId xmlns:p14="http://schemas.microsoft.com/office/powerpoint/2010/main" val="687364974"/>
+        <p14:creationId xmlns:p14="http://schemas.microsoft.com/office/powerpoint/2010/main" val="3744764378"/>
       </p:ext>
     </p:extLst>
   </p:cSld>
@@ -17206,6 +17498,436 @@
           </a:p>
         </p:txBody>
       </p:sp>
+      <mc:AlternateContent xmlns:mc="http://schemas.openxmlformats.org/markup-compatibility/2006">
+        <mc:Choice xmlns:a14="http://schemas.microsoft.com/office/drawing/2010/main" Requires="a14">
+          <p:sp>
+            <p:nvSpPr>
+              <p:cNvPr id="3" name="Marcador de contenido 2">
+                <a:extLst>
+                  <a:ext uri="{FF2B5EF4-FFF2-40B4-BE49-F238E27FC236}">
+                    <a16:creationId xmlns:a16="http://schemas.microsoft.com/office/drawing/2014/main" id="{4494177C-73C9-19D2-B33F-3A421F270BD1}"/>
+                  </a:ext>
+                </a:extLst>
+              </p:cNvPr>
+              <p:cNvSpPr>
+                <a:spLocks noGrp="1"/>
+              </p:cNvSpPr>
+              <p:nvPr>
+                <p:ph idx="1"/>
+              </p:nvPr>
+            </p:nvSpPr>
+            <p:spPr>
+              <a:xfrm>
+                <a:off x="831520" y="3097269"/>
+                <a:ext cx="16595985" cy="5850074"/>
+              </a:xfrm>
+            </p:spPr>
+            <p:txBody>
+              <a:bodyPr>
+                <a:normAutofit/>
+              </a:bodyPr>
+              <a:lstStyle/>
+              <a:p>
+                <a:r>
+                  <a:rPr lang="en-GB" dirty="0"/>
+                  <a:t>Create a dataset of 30 DMUs</a:t>
+                </a:r>
+              </a:p>
+              <a:p>
+                <a:r>
+                  <a:rPr lang="en-GB" dirty="0"/>
+                  <a:t>Input: x1</a:t>
+                </a:r>
+              </a:p>
+              <a:p>
+                <a:r>
+                  <a:rPr lang="en-GB" dirty="0"/>
+                  <a:t>Output: y</a:t>
+                </a:r>
+              </a:p>
+              <a:p>
+                <a:endParaRPr lang="en-GB" dirty="0"/>
+              </a:p>
+              <a:p>
+                <a:r>
+                  <a:rPr lang="en-GB" dirty="0"/>
+                  <a:t>Fitted model: SVM with </a:t>
+                </a:r>
+                <a:r>
+                  <a:rPr lang="en-GB" dirty="0" err="1"/>
+                  <a:t>polynomical</a:t>
+                </a:r>
+                <a:r>
+                  <a:rPr lang="en-GB" dirty="0"/>
+                  <a:t> kernel.</a:t>
+                </a:r>
+              </a:p>
+              <a:p>
+                <a:r>
+                  <a:rPr lang="en-GB" dirty="0"/>
+                  <a:t>Hyperparameters</a:t>
+                </a:r>
+                <a:r>
+                  <a:rPr lang="en-GB" sz="4400" dirty="0">
+                    <a:effectLst/>
+                    <a:latin typeface="DIN" panose="020B0604020202020204" charset="0"/>
+                    <a:ea typeface="Aptos" panose="020B0004020202020204" pitchFamily="34" charset="0"/>
+                    <a:cs typeface="Times New Roman" panose="02020603050405020304" pitchFamily="18" charset="0"/>
+                  </a:rPr>
+                  <a:t>:</a:t>
+                </a:r>
+                <a:r>
+                  <a:rPr lang="es-ES" sz="4400" i="1" dirty="0">
+                    <a:latin typeface="Cambria Math" panose="02040503050406030204" pitchFamily="18" charset="0"/>
+                    <a:ea typeface="Aptos" panose="020B0004020202020204" pitchFamily="34" charset="0"/>
+                    <a:cs typeface="Times New Roman" panose="02020603050405020304" pitchFamily="18" charset="0"/>
+                  </a:rPr>
+                  <a:t> </a:t>
+                </a:r>
+                <a14:m>
+                  <m:oMath xmlns:m="http://schemas.openxmlformats.org/officeDocument/2006/math">
+                    <m:r>
+                      <a:rPr lang="en-US" sz="4400" i="1" smtClean="0">
+                        <a:effectLst/>
+                        <a:latin typeface="Cambria Math" panose="02040503050406030204" pitchFamily="18" charset="0"/>
+                        <a:ea typeface="Aptos" panose="020B0004020202020204" pitchFamily="34" charset="0"/>
+                        <a:cs typeface="Times New Roman" panose="02020603050405020304" pitchFamily="18" charset="0"/>
+                      </a:rPr>
+                      <m:t>𝑑𝑒𝑔𝑟𝑒𝑒</m:t>
+                    </m:r>
+                    <m:r>
+                      <a:rPr lang="es-ES" sz="4400" b="0" i="1" smtClean="0">
+                        <a:effectLst/>
+                        <a:latin typeface="Cambria Math" panose="02040503050406030204" pitchFamily="18" charset="0"/>
+                        <a:ea typeface="Aptos" panose="020B0004020202020204" pitchFamily="34" charset="0"/>
+                        <a:cs typeface="Times New Roman" panose="02020603050405020304" pitchFamily="18" charset="0"/>
+                      </a:rPr>
+                      <m:t>=</m:t>
+                    </m:r>
+                    <m:r>
+                      <a:rPr lang="en-US" sz="4400" i="1" smtClean="0">
+                        <a:effectLst/>
+                        <a:latin typeface="Cambria Math" panose="02040503050406030204" pitchFamily="18" charset="0"/>
+                        <a:ea typeface="Aptos" panose="020B0004020202020204" pitchFamily="34" charset="0"/>
+                        <a:cs typeface="Times New Roman" panose="02020603050405020304" pitchFamily="18" charset="0"/>
+                      </a:rPr>
+                      <m:t>3</m:t>
+                    </m:r>
+                  </m:oMath>
+                </a14:m>
+                <a:r>
+                  <a:rPr lang="en-US" sz="4400" dirty="0">
+                    <a:effectLst/>
+                    <a:latin typeface="Times New Roman" panose="02020603050405020304" pitchFamily="18" charset="0"/>
+                    <a:ea typeface="Times New Roman" panose="02020603050405020304" pitchFamily="18" charset="0"/>
+                  </a:rPr>
+                  <a:t>, </a:t>
+                </a:r>
+                <a14:m>
+                  <m:oMath xmlns:m="http://schemas.openxmlformats.org/officeDocument/2006/math">
+                    <m:r>
+                      <a:rPr lang="en-US" sz="4400" i="1">
+                        <a:effectLst/>
+                        <a:latin typeface="Cambria Math" panose="02040503050406030204" pitchFamily="18" charset="0"/>
+                        <a:ea typeface="Times New Roman" panose="02020603050405020304" pitchFamily="18" charset="0"/>
+                        <a:cs typeface="Times New Roman" panose="02020603050405020304" pitchFamily="18" charset="0"/>
+                      </a:rPr>
+                      <m:t>𝑑𝑎𝑡𝑎</m:t>
+                    </m:r>
+                    <m:r>
+                      <a:rPr lang="en-US" sz="4400" i="1">
+                        <a:effectLst/>
+                        <a:latin typeface="Cambria Math" panose="02040503050406030204" pitchFamily="18" charset="0"/>
+                        <a:ea typeface="Times New Roman" panose="02020603050405020304" pitchFamily="18" charset="0"/>
+                        <a:cs typeface="Times New Roman" panose="02020603050405020304" pitchFamily="18" charset="0"/>
+                      </a:rPr>
+                      <m:t> </m:t>
+                    </m:r>
+                    <m:r>
+                      <a:rPr lang="en-US" sz="4400" i="1">
+                        <a:effectLst/>
+                        <a:latin typeface="Cambria Math" panose="02040503050406030204" pitchFamily="18" charset="0"/>
+                        <a:ea typeface="Times New Roman" panose="02020603050405020304" pitchFamily="18" charset="0"/>
+                        <a:cs typeface="Times New Roman" panose="02020603050405020304" pitchFamily="18" charset="0"/>
+                      </a:rPr>
+                      <m:t>𝑠𝑐𝑎𝑙𝑖𝑛𝑔</m:t>
+                    </m:r>
+                    <m:r>
+                      <a:rPr lang="es-ES" sz="4400" b="0" i="1" smtClean="0">
+                        <a:effectLst/>
+                        <a:latin typeface="Cambria Math" panose="02040503050406030204" pitchFamily="18" charset="0"/>
+                        <a:ea typeface="Times New Roman" panose="02020603050405020304" pitchFamily="18" charset="0"/>
+                        <a:cs typeface="Times New Roman" panose="02020603050405020304" pitchFamily="18" charset="0"/>
+                      </a:rPr>
+                      <m:t>=</m:t>
+                    </m:r>
+                    <m:r>
+                      <a:rPr lang="en-US" sz="4400" i="1">
+                        <a:effectLst/>
+                        <a:latin typeface="Cambria Math" panose="02040503050406030204" pitchFamily="18" charset="0"/>
+                        <a:ea typeface="Times New Roman" panose="02020603050405020304" pitchFamily="18" charset="0"/>
+                        <a:cs typeface="Times New Roman" panose="02020603050405020304" pitchFamily="18" charset="0"/>
+                      </a:rPr>
+                      <m:t>0.1</m:t>
+                    </m:r>
+                  </m:oMath>
+                </a14:m>
+                <a:r>
+                  <a:rPr lang="en-US" sz="4400" dirty="0">
+                    <a:effectLst/>
+                    <a:latin typeface="Times New Roman" panose="02020603050405020304" pitchFamily="18" charset="0"/>
+                    <a:ea typeface="Times New Roman" panose="02020603050405020304" pitchFamily="18" charset="0"/>
+                  </a:rPr>
+                  <a:t> and </a:t>
+                </a:r>
+                <a14:m>
+                  <m:oMath xmlns:m="http://schemas.openxmlformats.org/officeDocument/2006/math">
+                    <m:r>
+                      <a:rPr lang="en-US" sz="4400" i="1">
+                        <a:effectLst/>
+                        <a:latin typeface="Cambria Math" panose="02040503050406030204" pitchFamily="18" charset="0"/>
+                        <a:ea typeface="Times New Roman" panose="02020603050405020304" pitchFamily="18" charset="0"/>
+                        <a:cs typeface="Times New Roman" panose="02020603050405020304" pitchFamily="18" charset="0"/>
+                      </a:rPr>
+                      <m:t>𝑐𝑜𝑠𝑡</m:t>
+                    </m:r>
+                    <m:r>
+                      <a:rPr lang="es-ES" sz="4400" b="0" i="1" smtClean="0">
+                        <a:effectLst/>
+                        <a:latin typeface="Cambria Math" panose="02040503050406030204" pitchFamily="18" charset="0"/>
+                        <a:ea typeface="Times New Roman" panose="02020603050405020304" pitchFamily="18" charset="0"/>
+                        <a:cs typeface="Times New Roman" panose="02020603050405020304" pitchFamily="18" charset="0"/>
+                      </a:rPr>
+                      <m:t>=</m:t>
+                    </m:r>
+                    <m:r>
+                      <a:rPr lang="en-US" sz="4400" i="1">
+                        <a:effectLst/>
+                        <a:latin typeface="Cambria Math" panose="02040503050406030204" pitchFamily="18" charset="0"/>
+                        <a:ea typeface="Times New Roman" panose="02020603050405020304" pitchFamily="18" charset="0"/>
+                        <a:cs typeface="Times New Roman" panose="02020603050405020304" pitchFamily="18" charset="0"/>
+                      </a:rPr>
+                      <m:t>1</m:t>
+                    </m:r>
+                  </m:oMath>
+                </a14:m>
+                <a:r>
+                  <a:rPr lang="en-US" sz="4400" dirty="0">
+                    <a:effectLst/>
+                    <a:latin typeface="Times New Roman" panose="02020603050405020304" pitchFamily="18" charset="0"/>
+                    <a:ea typeface="Aptos" panose="020B0004020202020204" pitchFamily="34" charset="0"/>
+                  </a:rPr>
+                  <a:t>.</a:t>
+                </a:r>
+              </a:p>
+              <a:p>
+                <a:endParaRPr lang="en-GB" dirty="0"/>
+              </a:p>
+            </p:txBody>
+          </p:sp>
+        </mc:Choice>
+        <mc:Fallback>
+          <p:sp>
+            <p:nvSpPr>
+              <p:cNvPr id="3" name="Marcador de contenido 2">
+                <a:extLst>
+                  <a:ext uri="{FF2B5EF4-FFF2-40B4-BE49-F238E27FC236}">
+                    <a16:creationId xmlns:a16="http://schemas.microsoft.com/office/drawing/2014/main" id="{4494177C-73C9-19D2-B33F-3A421F270BD1}"/>
+                  </a:ext>
+                </a:extLst>
+              </p:cNvPr>
+              <p:cNvSpPr>
+                <a:spLocks noGrp="1" noRot="1" noChangeAspect="1" noMove="1" noResize="1" noEditPoints="1" noAdjustHandles="1" noChangeArrowheads="1" noChangeShapeType="1" noTextEdit="1"/>
+              </p:cNvSpPr>
+              <p:nvPr>
+                <p:ph idx="1"/>
+              </p:nvPr>
+            </p:nvSpPr>
+            <p:spPr>
+              <a:xfrm>
+                <a:off x="831520" y="3097269"/>
+                <a:ext cx="16595985" cy="5850074"/>
+              </a:xfrm>
+              <a:blipFill>
+                <a:blip r:embed="rId3"/>
+                <a:stretch>
+                  <a:fillRect l="-1285" t="-3125"/>
+                </a:stretch>
+              </a:blipFill>
+            </p:spPr>
+            <p:txBody>
+              <a:bodyPr/>
+              <a:lstStyle/>
+              <a:p>
+                <a:r>
+                  <a:rPr lang="es-ES">
+                    <a:noFill/>
+                  </a:rPr>
+                  <a:t> </a:t>
+                </a:r>
+              </a:p>
+            </p:txBody>
+          </p:sp>
+        </mc:Fallback>
+      </mc:AlternateContent>
+    </p:spTree>
+    <p:extLst>
+      <p:ext uri="{BB962C8B-B14F-4D97-AF65-F5344CB8AC3E}">
+        <p14:creationId xmlns:p14="http://schemas.microsoft.com/office/powerpoint/2010/main" val="3088146879"/>
+      </p:ext>
+    </p:extLst>
+  </p:cSld>
+  <p:clrMapOvr>
+    <a:masterClrMapping/>
+  </p:clrMapOvr>
+</p:sld>
+</file>
+
+<file path=ppt/slides/slide17.xml><?xml version="1.0" encoding="utf-8"?>
+<p:sld xmlns:a="http://schemas.openxmlformats.org/drawingml/2006/main" xmlns:r="http://schemas.openxmlformats.org/officeDocument/2006/relationships" xmlns:p="http://schemas.openxmlformats.org/presentationml/2006/main">
+  <p:cSld>
+    <p:spTree>
+      <p:nvGrpSpPr>
+        <p:cNvPr id="1" name=""/>
+        <p:cNvGrpSpPr/>
+        <p:nvPr/>
+      </p:nvGrpSpPr>
+      <p:grpSpPr>
+        <a:xfrm>
+          <a:off x="0" y="0"/>
+          <a:ext cx="0" cy="0"/>
+          <a:chOff x="0" y="0"/>
+          <a:chExt cx="0" cy="0"/>
+        </a:xfrm>
+      </p:grpSpPr>
+      <p:sp>
+        <p:nvSpPr>
+          <p:cNvPr id="2" name="Título 1">
+            <a:extLst>
+              <a:ext uri="{FF2B5EF4-FFF2-40B4-BE49-F238E27FC236}">
+                <a16:creationId xmlns:a16="http://schemas.microsoft.com/office/drawing/2014/main" id="{86BA8BD2-2360-47C4-A428-A34D4F1BE424}"/>
+              </a:ext>
+            </a:extLst>
+          </p:cNvPr>
+          <p:cNvSpPr>
+            <a:spLocks noGrp="1"/>
+          </p:cNvSpPr>
+          <p:nvPr>
+            <p:ph type="title"/>
+          </p:nvPr>
+        </p:nvSpPr>
+        <p:spPr/>
+        <p:txBody>
+          <a:bodyPr/>
+          <a:lstStyle/>
+          <a:p>
+            <a:r>
+              <a:rPr lang="es-ES" dirty="0"/>
+              <a:t>1D-SA: </a:t>
+            </a:r>
+            <a:r>
+              <a:rPr lang="es-ES" dirty="0" err="1"/>
+              <a:t>Example</a:t>
+            </a:r>
+            <a:endParaRPr lang="en-GB" dirty="0"/>
+          </a:p>
+        </p:txBody>
+      </p:sp>
+      <p:sp>
+        <p:nvSpPr>
+          <p:cNvPr id="4" name="Marcador de pie de página 3">
+            <a:extLst>
+              <a:ext uri="{FF2B5EF4-FFF2-40B4-BE49-F238E27FC236}">
+                <a16:creationId xmlns:a16="http://schemas.microsoft.com/office/drawing/2014/main" id="{32E9E3CC-AACD-421E-ADF4-8100E3695283}"/>
+              </a:ext>
+            </a:extLst>
+          </p:cNvPr>
+          <p:cNvSpPr>
+            <a:spLocks noGrp="1"/>
+          </p:cNvSpPr>
+          <p:nvPr>
+            <p:ph type="ftr" sz="quarter" idx="11"/>
+          </p:nvPr>
+        </p:nvSpPr>
+        <p:spPr/>
+        <p:txBody>
+          <a:bodyPr/>
+          <a:lstStyle/>
+          <a:p>
+            <a:pPr algn="ctr">
+              <a:lnSpc>
+                <a:spcPct val="150000"/>
+              </a:lnSpc>
+              <a:spcAft>
+                <a:spcPts val="800"/>
+              </a:spcAft>
+            </a:pPr>
+            <a:r>
+              <a:rPr lang="en-US" sz="1800" b="1" kern="100" dirty="0">
+                <a:effectLst/>
+                <a:latin typeface="Times New Roman" panose="02020603050405020304" pitchFamily="18" charset="0"/>
+                <a:ea typeface="Aptos" panose="020B0004020202020204" pitchFamily="34" charset="0"/>
+                <a:cs typeface="Times New Roman" panose="02020603050405020304" pitchFamily="18" charset="0"/>
+              </a:rPr>
+              <a:t>Using sensitivity analysis and visualization techniques to open black box data mining models: a </a:t>
+            </a:r>
+            <a:r>
+              <a:rPr lang="en-US" sz="1800" b="1" kern="100" dirty="0" err="1">
+                <a:effectLst/>
+                <a:latin typeface="Times New Roman" panose="02020603050405020304" pitchFamily="18" charset="0"/>
+                <a:ea typeface="Aptos" panose="020B0004020202020204" pitchFamily="34" charset="0"/>
+                <a:cs typeface="Times New Roman" panose="02020603050405020304" pitchFamily="18" charset="0"/>
+              </a:rPr>
+              <a:t>rminer</a:t>
+            </a:r>
+            <a:r>
+              <a:rPr lang="en-US" sz="1800" b="1" kern="100" dirty="0">
+                <a:effectLst/>
+                <a:latin typeface="Times New Roman" panose="02020603050405020304" pitchFamily="18" charset="0"/>
+                <a:ea typeface="Aptos" panose="020B0004020202020204" pitchFamily="34" charset="0"/>
+                <a:cs typeface="Times New Roman" panose="02020603050405020304" pitchFamily="18" charset="0"/>
+              </a:rPr>
+              <a:t> example</a:t>
+            </a:r>
+            <a:endParaRPr lang="es-ES" sz="1600" kern="100" dirty="0">
+              <a:effectLst/>
+              <a:latin typeface="Times New Roman" panose="02020603050405020304" pitchFamily="18" charset="0"/>
+              <a:ea typeface="Aptos" panose="020B0004020202020204" pitchFamily="34" charset="0"/>
+              <a:cs typeface="Times New Roman" panose="02020603050405020304" pitchFamily="18" charset="0"/>
+            </a:endParaRPr>
+          </a:p>
+        </p:txBody>
+      </p:sp>
+      <p:sp>
+        <p:nvSpPr>
+          <p:cNvPr id="5" name="Marcador de número de diapositiva 4">
+            <a:extLst>
+              <a:ext uri="{FF2B5EF4-FFF2-40B4-BE49-F238E27FC236}">
+                <a16:creationId xmlns:a16="http://schemas.microsoft.com/office/drawing/2014/main" id="{5CD26059-5682-4382-89E1-677AD7B72CFE}"/>
+              </a:ext>
+            </a:extLst>
+          </p:cNvPr>
+          <p:cNvSpPr>
+            <a:spLocks noGrp="1"/>
+          </p:cNvSpPr>
+          <p:nvPr>
+            <p:ph type="sldNum" sz="quarter" idx="12"/>
+          </p:nvPr>
+        </p:nvSpPr>
+        <p:spPr/>
+        <p:txBody>
+          <a:bodyPr/>
+          <a:lstStyle/>
+          <a:p>
+            <a:fld id="{DBFF9636-A71C-488A-89F8-02E08556F10C}" type="slidenum">
+              <a:rPr lang="es-ES" smtClean="0"/>
+              <a:pPr/>
+              <a:t>17</a:t>
+            </a:fld>
+            <a:endParaRPr lang="es-ES" dirty="0"/>
+          </a:p>
+        </p:txBody>
+      </p:sp>
       <p:sp>
         <p:nvSpPr>
           <p:cNvPr id="3" name="Marcador de contenido 2">
@@ -17234,14 +17956,466 @@
           </a:bodyPr>
           <a:lstStyle/>
           <a:p>
+            <a:r>
+              <a:rPr lang="es-ES" sz="4400" dirty="0" err="1">
+                <a:latin typeface="DIN" panose="020B0604020202020204" charset="0"/>
+                <a:ea typeface="Aptos" panose="020B0004020202020204" pitchFamily="34" charset="0"/>
+              </a:rPr>
+              <a:t>Inside</a:t>
+            </a:r>
+            <a:r>
+              <a:rPr lang="es-ES" sz="4400" dirty="0">
+                <a:latin typeface="DIN" panose="020B0604020202020204" charset="0"/>
+                <a:ea typeface="Aptos" panose="020B0004020202020204" pitchFamily="34" charset="0"/>
+              </a:rPr>
+              <a:t> </a:t>
+            </a:r>
+            <a:r>
+              <a:rPr lang="es-ES" sz="4400" dirty="0" err="1">
+                <a:latin typeface="DIN" panose="020B0604020202020204" charset="0"/>
+                <a:ea typeface="Aptos" panose="020B0004020202020204" pitchFamily="34" charset="0"/>
+              </a:rPr>
+              <a:t>of</a:t>
+            </a:r>
+            <a:r>
+              <a:rPr lang="es-ES" sz="4400" dirty="0">
+                <a:latin typeface="DIN" panose="020B0604020202020204" charset="0"/>
+                <a:ea typeface="Aptos" panose="020B0004020202020204" pitchFamily="34" charset="0"/>
+              </a:rPr>
+              <a:t> 1D-SA in </a:t>
+            </a:r>
+            <a:r>
+              <a:rPr lang="es-ES" sz="4400" dirty="0" err="1">
+                <a:latin typeface="DIN" panose="020B0604020202020204" charset="0"/>
+                <a:ea typeface="Aptos" panose="020B0004020202020204" pitchFamily="34" charset="0"/>
+              </a:rPr>
+              <a:t>rminer</a:t>
+            </a:r>
+            <a:r>
+              <a:rPr lang="es-ES" sz="4400" dirty="0">
+                <a:latin typeface="DIN" panose="020B0604020202020204" charset="0"/>
+                <a:ea typeface="Aptos" panose="020B0004020202020204" pitchFamily="34" charset="0"/>
+              </a:rPr>
+              <a:t>:</a:t>
+            </a:r>
+          </a:p>
+          <a:p>
+            <a:r>
+              <a:rPr lang="en-US" sz="4400" dirty="0">
+                <a:effectLst/>
+                <a:latin typeface="DIN" panose="020B0604020202020204" charset="0"/>
+                <a:ea typeface="Aptos" panose="020B0004020202020204" pitchFamily="34" charset="0"/>
+              </a:rPr>
+              <a:t>5 Levels</a:t>
+            </a:r>
+          </a:p>
+          <a:p>
             <a:endParaRPr lang="en-GB" dirty="0"/>
           </a:p>
         </p:txBody>
       </p:sp>
+      <p:graphicFrame>
+        <p:nvGraphicFramePr>
+          <p:cNvPr id="7" name="Tabla 6">
+            <a:extLst>
+              <a:ext uri="{FF2B5EF4-FFF2-40B4-BE49-F238E27FC236}">
+                <a16:creationId xmlns:a16="http://schemas.microsoft.com/office/drawing/2014/main" id="{C855300D-4EC3-A30A-DA28-AEF12564D44C}"/>
+              </a:ext>
+            </a:extLst>
+          </p:cNvPr>
+          <p:cNvGraphicFramePr>
+            <a:graphicFrameLocks noGrp="1"/>
+          </p:cNvGraphicFramePr>
+          <p:nvPr>
+            <p:extLst>
+              <p:ext uri="{D42A27DB-BD31-4B8C-83A1-F6EECF244321}">
+                <p14:modId xmlns:p14="http://schemas.microsoft.com/office/powerpoint/2010/main" val="3980734931"/>
+              </p:ext>
+            </p:extLst>
+          </p:nvPr>
+        </p:nvGraphicFramePr>
+        <p:xfrm>
+          <a:off x="3157415" y="4800417"/>
+          <a:ext cx="12192000" cy="3520440"/>
+        </p:xfrm>
+        <a:graphic>
+          <a:graphicData uri="http://schemas.openxmlformats.org/drawingml/2006/table">
+            <a:tbl>
+              <a:tblPr firstRow="1" bandRow="1">
+                <a:tableStyleId>{9D7B26C5-4107-4FEC-AEDC-1716B250A1EF}</a:tableStyleId>
+              </a:tblPr>
+              <a:tblGrid>
+                <a:gridCol w="4064000">
+                  <a:extLst>
+                    <a:ext uri="{9D8B030D-6E8A-4147-A177-3AD203B41FA5}">
+                      <a16:colId xmlns:a16="http://schemas.microsoft.com/office/drawing/2014/main" val="3943066496"/>
+                    </a:ext>
+                  </a:extLst>
+                </a:gridCol>
+                <a:gridCol w="4064000">
+                  <a:extLst>
+                    <a:ext uri="{9D8B030D-6E8A-4147-A177-3AD203B41FA5}">
+                      <a16:colId xmlns:a16="http://schemas.microsoft.com/office/drawing/2014/main" val="465688363"/>
+                    </a:ext>
+                  </a:extLst>
+                </a:gridCol>
+                <a:gridCol w="4064000">
+                  <a:extLst>
+                    <a:ext uri="{9D8B030D-6E8A-4147-A177-3AD203B41FA5}">
+                      <a16:colId xmlns:a16="http://schemas.microsoft.com/office/drawing/2014/main" val="3387116903"/>
+                    </a:ext>
+                  </a:extLst>
+                </a:gridCol>
+              </a:tblGrid>
+              <a:tr h="370840">
+                <a:tc>
+                  <a:txBody>
+                    <a:bodyPr/>
+                    <a:lstStyle/>
+                    <a:p>
+                      <a:endParaRPr lang="es-ES" dirty="0"/>
+                    </a:p>
+                  </a:txBody>
+                  <a:tcPr/>
+                </a:tc>
+                <a:tc>
+                  <a:txBody>
+                    <a:bodyPr/>
+                    <a:lstStyle/>
+                    <a:p>
+                      <a:pPr algn="ctr"/>
+                      <a:r>
+                        <a:rPr lang="es-ES" dirty="0"/>
+                        <a:t>x1</a:t>
+                      </a:r>
+                    </a:p>
+                  </a:txBody>
+                  <a:tcPr/>
+                </a:tc>
+                <a:tc>
+                  <a:txBody>
+                    <a:bodyPr/>
+                    <a:lstStyle/>
+                    <a:p>
+                      <a:pPr algn="ctr"/>
+                      <a:r>
+                        <a:rPr lang="es-ES" dirty="0"/>
+                        <a:t>y</a:t>
+                      </a:r>
+                    </a:p>
+                  </a:txBody>
+                  <a:tcPr/>
+                </a:tc>
+                <a:extLst>
+                  <a:ext uri="{0D108BD9-81ED-4DB2-BD59-A6C34878D82A}">
+                    <a16:rowId xmlns:a16="http://schemas.microsoft.com/office/drawing/2014/main" val="2368775951"/>
+                  </a:ext>
+                </a:extLst>
+              </a:tr>
+              <a:tr h="370840">
+                <a:tc>
+                  <a:txBody>
+                    <a:bodyPr/>
+                    <a:lstStyle/>
+                    <a:p>
+                      <a:r>
+                        <a:rPr lang="es-ES" dirty="0"/>
+                        <a:t>Min.</a:t>
+                      </a:r>
+                    </a:p>
+                  </a:txBody>
+                  <a:tcPr/>
+                </a:tc>
+                <a:tc>
+                  <a:txBody>
+                    <a:bodyPr/>
+                    <a:lstStyle/>
+                    <a:p>
+                      <a:pPr algn="ctr"/>
+                      <a:r>
+                        <a:rPr lang="es-ES" dirty="0"/>
+                        <a:t>1.010</a:t>
+                      </a:r>
+                    </a:p>
+                  </a:txBody>
+                  <a:tcPr/>
+                </a:tc>
+                <a:tc>
+                  <a:txBody>
+                    <a:bodyPr/>
+                    <a:lstStyle/>
+                    <a:p>
+                      <a:pPr algn="ctr"/>
+                      <a:r>
+                        <a:rPr lang="es-ES" dirty="0"/>
+                        <a:t>2.822</a:t>
+                      </a:r>
+                    </a:p>
+                  </a:txBody>
+                  <a:tcPr/>
+                </a:tc>
+                <a:extLst>
+                  <a:ext uri="{0D108BD9-81ED-4DB2-BD59-A6C34878D82A}">
+                    <a16:rowId xmlns:a16="http://schemas.microsoft.com/office/drawing/2014/main" val="1438970243"/>
+                  </a:ext>
+                </a:extLst>
+              </a:tr>
+              <a:tr h="370840">
+                <a:tc>
+                  <a:txBody>
+                    <a:bodyPr/>
+                    <a:lstStyle/>
+                    <a:p>
+                      <a:r>
+                        <a:rPr lang="es-ES" dirty="0"/>
+                        <a:t>1st Qu.</a:t>
+                      </a:r>
+                    </a:p>
+                  </a:txBody>
+                  <a:tcPr/>
+                </a:tc>
+                <a:tc>
+                  <a:txBody>
+                    <a:bodyPr/>
+                    <a:lstStyle/>
+                    <a:p>
+                      <a:pPr algn="ctr"/>
+                      <a:r>
+                        <a:rPr lang="es-ES" dirty="0"/>
+                        <a:t>2.748</a:t>
+                      </a:r>
+                    </a:p>
+                  </a:txBody>
+                  <a:tcPr/>
+                </a:tc>
+                <a:tc>
+                  <a:txBody>
+                    <a:bodyPr/>
+                    <a:lstStyle/>
+                    <a:p>
+                      <a:pPr algn="ctr"/>
+                      <a:r>
+                        <a:rPr lang="es-ES" dirty="0"/>
+                        <a:t>3.255</a:t>
+                      </a:r>
+                    </a:p>
+                  </a:txBody>
+                  <a:tcPr/>
+                </a:tc>
+                <a:extLst>
+                  <a:ext uri="{0D108BD9-81ED-4DB2-BD59-A6C34878D82A}">
+                    <a16:rowId xmlns:a16="http://schemas.microsoft.com/office/drawing/2014/main" val="601093408"/>
+                  </a:ext>
+                </a:extLst>
+              </a:tr>
+              <a:tr h="370840">
+                <a:tc>
+                  <a:txBody>
+                    <a:bodyPr/>
+                    <a:lstStyle/>
+                    <a:p>
+                      <a:r>
+                        <a:rPr lang="es-ES" dirty="0"/>
+                        <a:t>Median</a:t>
+                      </a:r>
+                    </a:p>
+                  </a:txBody>
+                  <a:tcPr/>
+                </a:tc>
+                <a:tc>
+                  <a:txBody>
+                    <a:bodyPr/>
+                    <a:lstStyle/>
+                    <a:p>
+                      <a:pPr algn="ctr"/>
+                      <a:r>
+                        <a:rPr lang="es-ES" dirty="0"/>
+                        <a:t>5.368</a:t>
+                      </a:r>
+                    </a:p>
+                  </a:txBody>
+                  <a:tcPr/>
+                </a:tc>
+                <a:tc>
+                  <a:txBody>
+                    <a:bodyPr/>
+                    <a:lstStyle/>
+                    <a:p>
+                      <a:pPr algn="ctr"/>
+                      <a:r>
+                        <a:rPr lang="es-ES" dirty="0"/>
+                        <a:t>3.878</a:t>
+                      </a:r>
+                    </a:p>
+                  </a:txBody>
+                  <a:tcPr/>
+                </a:tc>
+                <a:extLst>
+                  <a:ext uri="{0D108BD9-81ED-4DB2-BD59-A6C34878D82A}">
+                    <a16:rowId xmlns:a16="http://schemas.microsoft.com/office/drawing/2014/main" val="2583113639"/>
+                  </a:ext>
+                </a:extLst>
+              </a:tr>
+              <a:tr h="370840">
+                <a:tc>
+                  <a:txBody>
+                    <a:bodyPr/>
+                    <a:lstStyle/>
+                    <a:p>
+                      <a:r>
+                        <a:rPr lang="es-ES" dirty="0"/>
+                        <a:t>Mean</a:t>
+                      </a:r>
+                    </a:p>
+                  </a:txBody>
+                  <a:tcPr/>
+                </a:tc>
+                <a:tc>
+                  <a:txBody>
+                    <a:bodyPr/>
+                    <a:lstStyle/>
+                    <a:p>
+                      <a:pPr algn="ctr"/>
+                      <a:r>
+                        <a:rPr lang="es-ES" dirty="0">
+                          <a:highlight>
+                            <a:srgbClr val="FFFF00"/>
+                          </a:highlight>
+                        </a:rPr>
+                        <a:t>5.245</a:t>
+                      </a:r>
+                    </a:p>
+                  </a:txBody>
+                  <a:tcPr/>
+                </a:tc>
+                <a:tc>
+                  <a:txBody>
+                    <a:bodyPr/>
+                    <a:lstStyle/>
+                    <a:p>
+                      <a:pPr algn="ctr"/>
+                      <a:r>
+                        <a:rPr lang="es-ES" dirty="0">
+                          <a:highlight>
+                            <a:srgbClr val="FFFF00"/>
+                          </a:highlight>
+                        </a:rPr>
+                        <a:t>4.606</a:t>
+                      </a:r>
+                    </a:p>
+                  </a:txBody>
+                  <a:tcPr/>
+                </a:tc>
+                <a:extLst>
+                  <a:ext uri="{0D108BD9-81ED-4DB2-BD59-A6C34878D82A}">
+                    <a16:rowId xmlns:a16="http://schemas.microsoft.com/office/drawing/2014/main" val="143781526"/>
+                  </a:ext>
+                </a:extLst>
+              </a:tr>
+              <a:tr h="370840">
+                <a:tc>
+                  <a:txBody>
+                    <a:bodyPr/>
+                    <a:lstStyle/>
+                    <a:p>
+                      <a:r>
+                        <a:rPr lang="es-ES" dirty="0"/>
+                        <a:t>3rd Qu.</a:t>
+                      </a:r>
+                    </a:p>
+                  </a:txBody>
+                  <a:tcPr/>
+                </a:tc>
+                <a:tc>
+                  <a:txBody>
+                    <a:bodyPr/>
+                    <a:lstStyle/>
+                    <a:p>
+                      <a:pPr algn="ctr"/>
+                      <a:r>
+                        <a:rPr lang="es-ES" dirty="0"/>
+                        <a:t>7.508</a:t>
+                      </a:r>
+                    </a:p>
+                  </a:txBody>
+                  <a:tcPr/>
+                </a:tc>
+                <a:tc>
+                  <a:txBody>
+                    <a:bodyPr/>
+                    <a:lstStyle/>
+                    <a:p>
+                      <a:pPr algn="ctr"/>
+                      <a:r>
+                        <a:rPr lang="es-ES" dirty="0"/>
+                        <a:t>5.458</a:t>
+                      </a:r>
+                    </a:p>
+                  </a:txBody>
+                  <a:tcPr/>
+                </a:tc>
+                <a:extLst>
+                  <a:ext uri="{0D108BD9-81ED-4DB2-BD59-A6C34878D82A}">
+                    <a16:rowId xmlns:a16="http://schemas.microsoft.com/office/drawing/2014/main" val="126782558"/>
+                  </a:ext>
+                </a:extLst>
+              </a:tr>
+              <a:tr h="370840">
+                <a:tc>
+                  <a:txBody>
+                    <a:bodyPr/>
+                    <a:lstStyle/>
+                    <a:p>
+                      <a:r>
+                        <a:rPr lang="es-ES" dirty="0"/>
+                        <a:t>Max.</a:t>
+                      </a:r>
+                    </a:p>
+                  </a:txBody>
+                  <a:tcPr/>
+                </a:tc>
+                <a:tc>
+                  <a:txBody>
+                    <a:bodyPr/>
+                    <a:lstStyle/>
+                    <a:p>
+                      <a:pPr algn="ctr"/>
+                      <a:r>
+                        <a:rPr lang="es-ES" dirty="0"/>
+                        <a:t>9.065</a:t>
+                      </a:r>
+                    </a:p>
+                  </a:txBody>
+                  <a:tcPr/>
+                </a:tc>
+                <a:tc>
+                  <a:txBody>
+                    <a:bodyPr/>
+                    <a:lstStyle/>
+                    <a:p>
+                      <a:pPr algn="ctr"/>
+                      <a:r>
+                        <a:rPr lang="es-ES" dirty="0"/>
+                        <a:t>8.905</a:t>
+                      </a:r>
+                    </a:p>
+                  </a:txBody>
+                  <a:tcPr/>
+                </a:tc>
+                <a:extLst>
+                  <a:ext uri="{0D108BD9-81ED-4DB2-BD59-A6C34878D82A}">
+                    <a16:rowId xmlns:a16="http://schemas.microsoft.com/office/drawing/2014/main" val="2317857307"/>
+                  </a:ext>
+                </a:extLst>
+              </a:tr>
+            </a:tbl>
+          </a:graphicData>
+        </a:graphic>
+      </p:graphicFrame>
     </p:spTree>
     <p:extLst>
       <p:ext uri="{BB962C8B-B14F-4D97-AF65-F5344CB8AC3E}">
-        <p14:creationId xmlns:p14="http://schemas.microsoft.com/office/powerpoint/2010/main" val="3088146879"/>
+        <p14:creationId xmlns:p14="http://schemas.microsoft.com/office/powerpoint/2010/main" val="2718312220"/>
       </p:ext>
     </p:extLst>
   </p:cSld>
@@ -17251,7 +18425,1125 @@
 </p:sld>
 </file>
 
-<file path=ppt/slides/slide17.xml><?xml version="1.0" encoding="utf-8"?>
+<file path=ppt/slides/slide18.xml><?xml version="1.0" encoding="utf-8"?>
+<p:sld xmlns:a="http://schemas.openxmlformats.org/drawingml/2006/main" xmlns:r="http://schemas.openxmlformats.org/officeDocument/2006/relationships" xmlns:p="http://schemas.openxmlformats.org/presentationml/2006/main">
+  <p:cSld>
+    <p:spTree>
+      <p:nvGrpSpPr>
+        <p:cNvPr id="1" name=""/>
+        <p:cNvGrpSpPr/>
+        <p:nvPr/>
+      </p:nvGrpSpPr>
+      <p:grpSpPr>
+        <a:xfrm>
+          <a:off x="0" y="0"/>
+          <a:ext cx="0" cy="0"/>
+          <a:chOff x="0" y="0"/>
+          <a:chExt cx="0" cy="0"/>
+        </a:xfrm>
+      </p:grpSpPr>
+      <p:sp>
+        <p:nvSpPr>
+          <p:cNvPr id="2" name="Título 1">
+            <a:extLst>
+              <a:ext uri="{FF2B5EF4-FFF2-40B4-BE49-F238E27FC236}">
+                <a16:creationId xmlns:a16="http://schemas.microsoft.com/office/drawing/2014/main" id="{86BA8BD2-2360-47C4-A428-A34D4F1BE424}"/>
+              </a:ext>
+            </a:extLst>
+          </p:cNvPr>
+          <p:cNvSpPr>
+            <a:spLocks noGrp="1"/>
+          </p:cNvSpPr>
+          <p:nvPr>
+            <p:ph type="title"/>
+          </p:nvPr>
+        </p:nvSpPr>
+        <p:spPr/>
+        <p:txBody>
+          <a:bodyPr/>
+          <a:lstStyle/>
+          <a:p>
+            <a:r>
+              <a:rPr lang="es-ES" dirty="0"/>
+              <a:t>1D-SA: </a:t>
+            </a:r>
+            <a:r>
+              <a:rPr lang="es-ES" dirty="0" err="1"/>
+              <a:t>Example</a:t>
+            </a:r>
+            <a:endParaRPr lang="en-GB" dirty="0"/>
+          </a:p>
+        </p:txBody>
+      </p:sp>
+      <p:sp>
+        <p:nvSpPr>
+          <p:cNvPr id="4" name="Marcador de pie de página 3">
+            <a:extLst>
+              <a:ext uri="{FF2B5EF4-FFF2-40B4-BE49-F238E27FC236}">
+                <a16:creationId xmlns:a16="http://schemas.microsoft.com/office/drawing/2014/main" id="{32E9E3CC-AACD-421E-ADF4-8100E3695283}"/>
+              </a:ext>
+            </a:extLst>
+          </p:cNvPr>
+          <p:cNvSpPr>
+            <a:spLocks noGrp="1"/>
+          </p:cNvSpPr>
+          <p:nvPr>
+            <p:ph type="ftr" sz="quarter" idx="11"/>
+          </p:nvPr>
+        </p:nvSpPr>
+        <p:spPr/>
+        <p:txBody>
+          <a:bodyPr/>
+          <a:lstStyle/>
+          <a:p>
+            <a:pPr algn="ctr">
+              <a:lnSpc>
+                <a:spcPct val="150000"/>
+              </a:lnSpc>
+              <a:spcAft>
+                <a:spcPts val="800"/>
+              </a:spcAft>
+            </a:pPr>
+            <a:r>
+              <a:rPr lang="en-US" sz="1800" b="1" kern="100" dirty="0">
+                <a:effectLst/>
+                <a:latin typeface="Times New Roman" panose="02020603050405020304" pitchFamily="18" charset="0"/>
+                <a:ea typeface="Aptos" panose="020B0004020202020204" pitchFamily="34" charset="0"/>
+                <a:cs typeface="Times New Roman" panose="02020603050405020304" pitchFamily="18" charset="0"/>
+              </a:rPr>
+              <a:t>Using sensitivity analysis and visualization techniques to open black box data mining models: a </a:t>
+            </a:r>
+            <a:r>
+              <a:rPr lang="en-US" sz="1800" b="1" kern="100" dirty="0" err="1">
+                <a:effectLst/>
+                <a:latin typeface="Times New Roman" panose="02020603050405020304" pitchFamily="18" charset="0"/>
+                <a:ea typeface="Aptos" panose="020B0004020202020204" pitchFamily="34" charset="0"/>
+                <a:cs typeface="Times New Roman" panose="02020603050405020304" pitchFamily="18" charset="0"/>
+              </a:rPr>
+              <a:t>rminer</a:t>
+            </a:r>
+            <a:r>
+              <a:rPr lang="en-US" sz="1800" b="1" kern="100" dirty="0">
+                <a:effectLst/>
+                <a:latin typeface="Times New Roman" panose="02020603050405020304" pitchFamily="18" charset="0"/>
+                <a:ea typeface="Aptos" panose="020B0004020202020204" pitchFamily="34" charset="0"/>
+                <a:cs typeface="Times New Roman" panose="02020603050405020304" pitchFamily="18" charset="0"/>
+              </a:rPr>
+              <a:t> example</a:t>
+            </a:r>
+            <a:endParaRPr lang="es-ES" sz="1600" kern="100" dirty="0">
+              <a:effectLst/>
+              <a:latin typeface="Times New Roman" panose="02020603050405020304" pitchFamily="18" charset="0"/>
+              <a:ea typeface="Aptos" panose="020B0004020202020204" pitchFamily="34" charset="0"/>
+              <a:cs typeface="Times New Roman" panose="02020603050405020304" pitchFamily="18" charset="0"/>
+            </a:endParaRPr>
+          </a:p>
+        </p:txBody>
+      </p:sp>
+      <p:sp>
+        <p:nvSpPr>
+          <p:cNvPr id="5" name="Marcador de número de diapositiva 4">
+            <a:extLst>
+              <a:ext uri="{FF2B5EF4-FFF2-40B4-BE49-F238E27FC236}">
+                <a16:creationId xmlns:a16="http://schemas.microsoft.com/office/drawing/2014/main" id="{5CD26059-5682-4382-89E1-677AD7B72CFE}"/>
+              </a:ext>
+            </a:extLst>
+          </p:cNvPr>
+          <p:cNvSpPr>
+            <a:spLocks noGrp="1"/>
+          </p:cNvSpPr>
+          <p:nvPr>
+            <p:ph type="sldNum" sz="quarter" idx="12"/>
+          </p:nvPr>
+        </p:nvSpPr>
+        <p:spPr/>
+        <p:txBody>
+          <a:bodyPr/>
+          <a:lstStyle/>
+          <a:p>
+            <a:fld id="{DBFF9636-A71C-488A-89F8-02E08556F10C}" type="slidenum">
+              <a:rPr lang="es-ES" smtClean="0"/>
+              <a:pPr/>
+              <a:t>18</a:t>
+            </a:fld>
+            <a:endParaRPr lang="es-ES" dirty="0"/>
+          </a:p>
+        </p:txBody>
+      </p:sp>
+      <p:sp>
+        <p:nvSpPr>
+          <p:cNvPr id="3" name="Marcador de contenido 2">
+            <a:extLst>
+              <a:ext uri="{FF2B5EF4-FFF2-40B4-BE49-F238E27FC236}">
+                <a16:creationId xmlns:a16="http://schemas.microsoft.com/office/drawing/2014/main" id="{4494177C-73C9-19D2-B33F-3A421F270BD1}"/>
+              </a:ext>
+            </a:extLst>
+          </p:cNvPr>
+          <p:cNvSpPr>
+            <a:spLocks noGrp="1"/>
+          </p:cNvSpPr>
+          <p:nvPr>
+            <p:ph idx="1"/>
+          </p:nvPr>
+        </p:nvSpPr>
+        <p:spPr>
+          <a:xfrm>
+            <a:off x="831520" y="3097269"/>
+            <a:ext cx="16595985" cy="5850074"/>
+          </a:xfrm>
+        </p:spPr>
+        <p:txBody>
+          <a:bodyPr>
+            <a:normAutofit/>
+          </a:bodyPr>
+          <a:lstStyle/>
+          <a:p>
+            <a:r>
+              <a:rPr lang="en-US" sz="4400" dirty="0">
+                <a:effectLst/>
+                <a:latin typeface="DIN" panose="020B0604020202020204" charset="0"/>
+                <a:ea typeface="Aptos" panose="020B0004020202020204" pitchFamily="34" charset="0"/>
+              </a:rPr>
+              <a:t>5 Levels for x1:</a:t>
+            </a:r>
+          </a:p>
+          <a:p>
+            <a:endParaRPr lang="en-GB" dirty="0"/>
+          </a:p>
+        </p:txBody>
+      </p:sp>
+      <mc:AlternateContent xmlns:mc="http://schemas.openxmlformats.org/markup-compatibility/2006">
+        <mc:Choice xmlns:a14="http://schemas.microsoft.com/office/drawing/2010/main" Requires="a14">
+          <p:graphicFrame>
+            <p:nvGraphicFramePr>
+              <p:cNvPr id="8" name="Tabla 7">
+                <a:extLst>
+                  <a:ext uri="{FF2B5EF4-FFF2-40B4-BE49-F238E27FC236}">
+                    <a16:creationId xmlns:a16="http://schemas.microsoft.com/office/drawing/2014/main" id="{4A5A667A-8600-BF3F-E1B5-5DE17A9F5BEF}"/>
+                  </a:ext>
+                </a:extLst>
+              </p:cNvPr>
+              <p:cNvGraphicFramePr>
+                <a:graphicFrameLocks noGrp="1"/>
+              </p:cNvGraphicFramePr>
+              <p:nvPr>
+                <p:extLst>
+                  <p:ext uri="{D42A27DB-BD31-4B8C-83A1-F6EECF244321}">
+                    <p14:modId xmlns:p14="http://schemas.microsoft.com/office/powerpoint/2010/main" val="2959815007"/>
+                  </p:ext>
+                </p:extLst>
+              </p:nvPr>
+            </p:nvGraphicFramePr>
+            <p:xfrm>
+              <a:off x="3048000" y="4397753"/>
+              <a:ext cx="12192000" cy="3017520"/>
+            </p:xfrm>
+            <a:graphic>
+              <a:graphicData uri="http://schemas.openxmlformats.org/drawingml/2006/table">
+                <a:tbl>
+                  <a:tblPr firstRow="1" bandRow="1">
+                    <a:tableStyleId>{9D7B26C5-4107-4FEC-AEDC-1716B250A1EF}</a:tableStyleId>
+                  </a:tblPr>
+                  <a:tblGrid>
+                    <a:gridCol w="3048000">
+                      <a:extLst>
+                        <a:ext uri="{9D8B030D-6E8A-4147-A177-3AD203B41FA5}">
+                          <a16:colId xmlns:a16="http://schemas.microsoft.com/office/drawing/2014/main" val="1141248781"/>
+                        </a:ext>
+                      </a:extLst>
+                    </a:gridCol>
+                    <a:gridCol w="3048000">
+                      <a:extLst>
+                        <a:ext uri="{9D8B030D-6E8A-4147-A177-3AD203B41FA5}">
+                          <a16:colId xmlns:a16="http://schemas.microsoft.com/office/drawing/2014/main" val="2109301291"/>
+                        </a:ext>
+                      </a:extLst>
+                    </a:gridCol>
+                    <a:gridCol w="3048000">
+                      <a:extLst>
+                        <a:ext uri="{9D8B030D-6E8A-4147-A177-3AD203B41FA5}">
+                          <a16:colId xmlns:a16="http://schemas.microsoft.com/office/drawing/2014/main" val="4117115380"/>
+                        </a:ext>
+                      </a:extLst>
+                    </a:gridCol>
+                    <a:gridCol w="3048000">
+                      <a:extLst>
+                        <a:ext uri="{9D8B030D-6E8A-4147-A177-3AD203B41FA5}">
+                          <a16:colId xmlns:a16="http://schemas.microsoft.com/office/drawing/2014/main" val="970864078"/>
+                        </a:ext>
+                      </a:extLst>
+                    </a:gridCol>
+                  </a:tblGrid>
+                  <a:tr h="370840">
+                    <a:tc>
+                      <a:txBody>
+                        <a:bodyPr/>
+                        <a:lstStyle/>
+                        <a:p>
+                          <a:r>
+                            <a:rPr lang="es-ES" dirty="0" err="1"/>
+                            <a:t>Levels</a:t>
+                          </a:r>
+                          <a:endParaRPr lang="es-ES" dirty="0"/>
+                        </a:p>
+                      </a:txBody>
+                      <a:tcPr/>
+                    </a:tc>
+                    <a:tc>
+                      <a:txBody>
+                        <a:bodyPr/>
+                        <a:lstStyle/>
+                        <a:p>
+                          <a:r>
+                            <a:rPr lang="es-ES" dirty="0"/>
+                            <a:t>X1 </a:t>
+                          </a:r>
+                          <a:r>
+                            <a:rPr lang="es-ES" dirty="0" err="1"/>
+                            <a:t>values</a:t>
+                          </a:r>
+                          <a:endParaRPr lang="es-ES" dirty="0"/>
+                        </a:p>
+                      </a:txBody>
+                      <a:tcPr/>
+                    </a:tc>
+                    <a:tc>
+                      <a:txBody>
+                        <a:bodyPr/>
+                        <a:lstStyle/>
+                        <a:p>
+                          <a14:m>
+                            <m:oMathPara xmlns:m="http://schemas.openxmlformats.org/officeDocument/2006/math">
+                              <m:oMathParaPr>
+                                <m:jc m:val="centerGroup"/>
+                              </m:oMathParaPr>
+                              <m:oMath xmlns:m="http://schemas.openxmlformats.org/officeDocument/2006/math">
+                                <m:acc>
+                                  <m:accPr>
+                                    <m:chr m:val="̂"/>
+                                    <m:ctrlPr>
+                                      <a:rPr lang="es-ES" smtClean="0"/>
+                                    </m:ctrlPr>
+                                  </m:accPr>
+                                  <m:e>
+                                    <m:r>
+                                      <a:rPr lang="es-ES" b="1" smtClean="0"/>
+                                      <m:t>𝒚</m:t>
+                                    </m:r>
+                                  </m:e>
+                                </m:acc>
+                              </m:oMath>
+                            </m:oMathPara>
+                          </a14:m>
+                          <a:endParaRPr lang="es-ES" dirty="0"/>
+                        </a:p>
+                      </a:txBody>
+                      <a:tcPr/>
+                    </a:tc>
+                    <a:tc>
+                      <a:txBody>
+                        <a:bodyPr/>
+                        <a:lstStyle/>
+                        <a:p>
+                          <a:r>
+                            <a:rPr lang="es-ES" dirty="0"/>
+                            <a:t>Prob. be </a:t>
+                          </a:r>
+                          <a:r>
+                            <a:rPr lang="es-ES" dirty="0" err="1"/>
+                            <a:t>efficient</a:t>
+                          </a:r>
+                          <a:endParaRPr lang="es-ES" dirty="0"/>
+                        </a:p>
+                      </a:txBody>
+                      <a:tcPr/>
+                    </a:tc>
+                    <a:extLst>
+                      <a:ext uri="{0D108BD9-81ED-4DB2-BD59-A6C34878D82A}">
+                        <a16:rowId xmlns:a16="http://schemas.microsoft.com/office/drawing/2014/main" val="4092000649"/>
+                      </a:ext>
+                    </a:extLst>
+                  </a:tr>
+                  <a:tr h="370840">
+                    <a:tc>
+                      <a:txBody>
+                        <a:bodyPr/>
+                        <a:lstStyle/>
+                        <a:p>
+                          <a:r>
+                            <a:rPr lang="es-ES" dirty="0"/>
+                            <a:t>1</a:t>
+                          </a:r>
+                        </a:p>
+                      </a:txBody>
+                      <a:tcPr/>
+                    </a:tc>
+                    <a:tc>
+                      <a:txBody>
+                        <a:bodyPr/>
+                        <a:lstStyle/>
+                        <a:p>
+                          <a:pPr algn="ctr"/>
+                          <a:r>
+                            <a:rPr lang="es-ES" dirty="0"/>
+                            <a:t>1.009995</a:t>
+                          </a:r>
+                        </a:p>
+                      </a:txBody>
+                      <a:tcPr/>
+                    </a:tc>
+                    <a:tc>
+                      <a:txBody>
+                        <a:bodyPr/>
+                        <a:lstStyle/>
+                        <a:p>
+                          <a:pPr algn="ctr"/>
+                          <a:r>
+                            <a:rPr lang="es-ES" dirty="0"/>
+                            <a:t>4.606</a:t>
+                          </a:r>
+                        </a:p>
+                      </a:txBody>
+                      <a:tcPr/>
+                    </a:tc>
+                    <a:tc>
+                      <a:txBody>
+                        <a:bodyPr/>
+                        <a:lstStyle/>
+                        <a:p>
+                          <a:pPr algn="ctr"/>
+                          <a:r>
+                            <a:rPr lang="es-ES" dirty="0"/>
+                            <a:t>0.96</a:t>
+                          </a:r>
+                        </a:p>
+                      </a:txBody>
+                      <a:tcPr/>
+                    </a:tc>
+                    <a:extLst>
+                      <a:ext uri="{0D108BD9-81ED-4DB2-BD59-A6C34878D82A}">
+                        <a16:rowId xmlns:a16="http://schemas.microsoft.com/office/drawing/2014/main" val="187936132"/>
+                      </a:ext>
+                    </a:extLst>
+                  </a:tr>
+                  <a:tr h="370840">
+                    <a:tc>
+                      <a:txBody>
+                        <a:bodyPr/>
+                        <a:lstStyle/>
+                        <a:p>
+                          <a:r>
+                            <a:rPr lang="es-ES" dirty="0"/>
+                            <a:t>2</a:t>
+                          </a:r>
+                        </a:p>
+                      </a:txBody>
+                      <a:tcPr/>
+                    </a:tc>
+                    <a:tc>
+                      <a:txBody>
+                        <a:bodyPr/>
+                        <a:lstStyle/>
+                        <a:p>
+                          <a:pPr algn="ctr"/>
+                          <a:r>
+                            <a:rPr lang="es-ES" dirty="0"/>
+                            <a:t>3.023767</a:t>
+                          </a:r>
+                        </a:p>
+                      </a:txBody>
+                      <a:tcPr/>
+                    </a:tc>
+                    <a:tc>
+                      <a:txBody>
+                        <a:bodyPr/>
+                        <a:lstStyle/>
+                        <a:p>
+                          <a:pPr algn="ctr"/>
+                          <a:r>
+                            <a:rPr lang="es-ES" dirty="0"/>
+                            <a:t>4.606</a:t>
+                          </a:r>
+                        </a:p>
+                      </a:txBody>
+                      <a:tcPr/>
+                    </a:tc>
+                    <a:tc>
+                      <a:txBody>
+                        <a:bodyPr/>
+                        <a:lstStyle/>
+                        <a:p>
+                          <a:pPr algn="ctr"/>
+                          <a:r>
+                            <a:rPr lang="es-ES" dirty="0"/>
+                            <a:t>0.62</a:t>
+                          </a:r>
+                        </a:p>
+                      </a:txBody>
+                      <a:tcPr/>
+                    </a:tc>
+                    <a:extLst>
+                      <a:ext uri="{0D108BD9-81ED-4DB2-BD59-A6C34878D82A}">
+                        <a16:rowId xmlns:a16="http://schemas.microsoft.com/office/drawing/2014/main" val="2610583558"/>
+                      </a:ext>
+                    </a:extLst>
+                  </a:tr>
+                  <a:tr h="370840">
+                    <a:tc>
+                      <a:txBody>
+                        <a:bodyPr/>
+                        <a:lstStyle/>
+                        <a:p>
+                          <a:r>
+                            <a:rPr lang="es-ES" dirty="0"/>
+                            <a:t>3</a:t>
+                          </a:r>
+                        </a:p>
+                      </a:txBody>
+                      <a:tcPr/>
+                    </a:tc>
+                    <a:tc>
+                      <a:txBody>
+                        <a:bodyPr/>
+                        <a:lstStyle/>
+                        <a:p>
+                          <a:pPr algn="ctr"/>
+                          <a:r>
+                            <a:rPr lang="es-ES" dirty="0"/>
+                            <a:t>5.037538</a:t>
+                          </a:r>
+                        </a:p>
+                      </a:txBody>
+                      <a:tcPr/>
+                    </a:tc>
+                    <a:tc>
+                      <a:txBody>
+                        <a:bodyPr/>
+                        <a:lstStyle/>
+                        <a:p>
+                          <a:pPr algn="ctr"/>
+                          <a:r>
+                            <a:rPr lang="es-ES" dirty="0"/>
+                            <a:t>4.606</a:t>
+                          </a:r>
+                        </a:p>
+                      </a:txBody>
+                      <a:tcPr/>
+                    </a:tc>
+                    <a:tc>
+                      <a:txBody>
+                        <a:bodyPr/>
+                        <a:lstStyle/>
+                        <a:p>
+                          <a:pPr algn="ctr"/>
+                          <a:r>
+                            <a:rPr lang="es-ES" dirty="0"/>
+                            <a:t>0.14</a:t>
+                          </a:r>
+                        </a:p>
+                      </a:txBody>
+                      <a:tcPr/>
+                    </a:tc>
+                    <a:extLst>
+                      <a:ext uri="{0D108BD9-81ED-4DB2-BD59-A6C34878D82A}">
+                        <a16:rowId xmlns:a16="http://schemas.microsoft.com/office/drawing/2014/main" val="3779409085"/>
+                      </a:ext>
+                    </a:extLst>
+                  </a:tr>
+                  <a:tr h="370840">
+                    <a:tc>
+                      <a:txBody>
+                        <a:bodyPr/>
+                        <a:lstStyle/>
+                        <a:p>
+                          <a:r>
+                            <a:rPr lang="es-ES" dirty="0"/>
+                            <a:t>4</a:t>
+                          </a:r>
+                        </a:p>
+                      </a:txBody>
+                      <a:tcPr/>
+                    </a:tc>
+                    <a:tc>
+                      <a:txBody>
+                        <a:bodyPr/>
+                        <a:lstStyle/>
+                        <a:p>
+                          <a:pPr algn="ctr"/>
+                          <a:r>
+                            <a:rPr lang="es-ES" dirty="0"/>
+                            <a:t>7.051310</a:t>
+                          </a:r>
+                        </a:p>
+                      </a:txBody>
+                      <a:tcPr/>
+                    </a:tc>
+                    <a:tc>
+                      <a:txBody>
+                        <a:bodyPr/>
+                        <a:lstStyle/>
+                        <a:p>
+                          <a:pPr algn="ctr"/>
+                          <a:r>
+                            <a:rPr lang="es-ES" dirty="0"/>
+                            <a:t>4.606</a:t>
+                          </a:r>
+                        </a:p>
+                      </a:txBody>
+                      <a:tcPr/>
+                    </a:tc>
+                    <a:tc>
+                      <a:txBody>
+                        <a:bodyPr/>
+                        <a:lstStyle/>
+                        <a:p>
+                          <a:pPr algn="ctr"/>
+                          <a:r>
+                            <a:rPr lang="es-ES" dirty="0"/>
+                            <a:t>0.02</a:t>
+                          </a:r>
+                        </a:p>
+                      </a:txBody>
+                      <a:tcPr/>
+                    </a:tc>
+                    <a:extLst>
+                      <a:ext uri="{0D108BD9-81ED-4DB2-BD59-A6C34878D82A}">
+                        <a16:rowId xmlns:a16="http://schemas.microsoft.com/office/drawing/2014/main" val="1090756739"/>
+                      </a:ext>
+                    </a:extLst>
+                  </a:tr>
+                  <a:tr h="370840">
+                    <a:tc>
+                      <a:txBody>
+                        <a:bodyPr/>
+                        <a:lstStyle/>
+                        <a:p>
+                          <a:r>
+                            <a:rPr lang="es-ES" dirty="0"/>
+                            <a:t>5</a:t>
+                          </a:r>
+                        </a:p>
+                      </a:txBody>
+                      <a:tcPr/>
+                    </a:tc>
+                    <a:tc>
+                      <a:txBody>
+                        <a:bodyPr/>
+                        <a:lstStyle/>
+                        <a:p>
+                          <a:pPr algn="ctr"/>
+                          <a:r>
+                            <a:rPr lang="es-ES" dirty="0"/>
+                            <a:t>9.065082</a:t>
+                          </a:r>
+                        </a:p>
+                      </a:txBody>
+                      <a:tcPr/>
+                    </a:tc>
+                    <a:tc>
+                      <a:txBody>
+                        <a:bodyPr/>
+                        <a:lstStyle/>
+                        <a:p>
+                          <a:pPr algn="ctr"/>
+                          <a:r>
+                            <a:rPr lang="es-ES" dirty="0"/>
+                            <a:t>4.606</a:t>
+                          </a:r>
+                        </a:p>
+                      </a:txBody>
+                      <a:tcPr/>
+                    </a:tc>
+                    <a:tc>
+                      <a:txBody>
+                        <a:bodyPr/>
+                        <a:lstStyle/>
+                        <a:p>
+                          <a:pPr algn="ctr"/>
+                          <a:r>
+                            <a:rPr lang="es-ES" dirty="0"/>
+                            <a:t>0.00</a:t>
+                          </a:r>
+                        </a:p>
+                      </a:txBody>
+                      <a:tcPr/>
+                    </a:tc>
+                    <a:extLst>
+                      <a:ext uri="{0D108BD9-81ED-4DB2-BD59-A6C34878D82A}">
+                        <a16:rowId xmlns:a16="http://schemas.microsoft.com/office/drawing/2014/main" val="183639519"/>
+                      </a:ext>
+                    </a:extLst>
+                  </a:tr>
+                </a:tbl>
+              </a:graphicData>
+            </a:graphic>
+          </p:graphicFrame>
+        </mc:Choice>
+        <mc:Fallback>
+          <p:graphicFrame>
+            <p:nvGraphicFramePr>
+              <p:cNvPr id="8" name="Tabla 7">
+                <a:extLst>
+                  <a:ext uri="{FF2B5EF4-FFF2-40B4-BE49-F238E27FC236}">
+                    <a16:creationId xmlns:a16="http://schemas.microsoft.com/office/drawing/2014/main" id="{4A5A667A-8600-BF3F-E1B5-5DE17A9F5BEF}"/>
+                  </a:ext>
+                </a:extLst>
+              </p:cNvPr>
+              <p:cNvGraphicFramePr>
+                <a:graphicFrameLocks noGrp="1"/>
+              </p:cNvGraphicFramePr>
+              <p:nvPr>
+                <p:extLst>
+                  <p:ext uri="{D42A27DB-BD31-4B8C-83A1-F6EECF244321}">
+                    <p14:modId xmlns:p14="http://schemas.microsoft.com/office/powerpoint/2010/main" val="2959815007"/>
+                  </p:ext>
+                </p:extLst>
+              </p:nvPr>
+            </p:nvGraphicFramePr>
+            <p:xfrm>
+              <a:off x="3048000" y="4397753"/>
+              <a:ext cx="12192000" cy="3017520"/>
+            </p:xfrm>
+            <a:graphic>
+              <a:graphicData uri="http://schemas.openxmlformats.org/drawingml/2006/table">
+                <a:tbl>
+                  <a:tblPr firstRow="1" bandRow="1">
+                    <a:tableStyleId>{9D7B26C5-4107-4FEC-AEDC-1716B250A1EF}</a:tableStyleId>
+                  </a:tblPr>
+                  <a:tblGrid>
+                    <a:gridCol w="3048000">
+                      <a:extLst>
+                        <a:ext uri="{9D8B030D-6E8A-4147-A177-3AD203B41FA5}">
+                          <a16:colId xmlns:a16="http://schemas.microsoft.com/office/drawing/2014/main" val="1141248781"/>
+                        </a:ext>
+                      </a:extLst>
+                    </a:gridCol>
+                    <a:gridCol w="3048000">
+                      <a:extLst>
+                        <a:ext uri="{9D8B030D-6E8A-4147-A177-3AD203B41FA5}">
+                          <a16:colId xmlns:a16="http://schemas.microsoft.com/office/drawing/2014/main" val="2109301291"/>
+                        </a:ext>
+                      </a:extLst>
+                    </a:gridCol>
+                    <a:gridCol w="3048000">
+                      <a:extLst>
+                        <a:ext uri="{9D8B030D-6E8A-4147-A177-3AD203B41FA5}">
+                          <a16:colId xmlns:a16="http://schemas.microsoft.com/office/drawing/2014/main" val="4117115380"/>
+                        </a:ext>
+                      </a:extLst>
+                    </a:gridCol>
+                    <a:gridCol w="3048000">
+                      <a:extLst>
+                        <a:ext uri="{9D8B030D-6E8A-4147-A177-3AD203B41FA5}">
+                          <a16:colId xmlns:a16="http://schemas.microsoft.com/office/drawing/2014/main" val="970864078"/>
+                        </a:ext>
+                      </a:extLst>
+                    </a:gridCol>
+                  </a:tblGrid>
+                  <a:tr h="502920">
+                    <a:tc>
+                      <a:txBody>
+                        <a:bodyPr/>
+                        <a:lstStyle/>
+                        <a:p>
+                          <a:r>
+                            <a:rPr lang="es-ES" dirty="0" err="1"/>
+                            <a:t>Levels</a:t>
+                          </a:r>
+                          <a:endParaRPr lang="es-ES" dirty="0"/>
+                        </a:p>
+                      </a:txBody>
+                      <a:tcPr/>
+                    </a:tc>
+                    <a:tc>
+                      <a:txBody>
+                        <a:bodyPr/>
+                        <a:lstStyle/>
+                        <a:p>
+                          <a:r>
+                            <a:rPr lang="es-ES" dirty="0"/>
+                            <a:t>X1 </a:t>
+                          </a:r>
+                          <a:r>
+                            <a:rPr lang="es-ES" dirty="0" err="1"/>
+                            <a:t>values</a:t>
+                          </a:r>
+                          <a:endParaRPr lang="es-ES" dirty="0"/>
+                        </a:p>
+                      </a:txBody>
+                      <a:tcPr/>
+                    </a:tc>
+                    <a:tc>
+                      <a:txBody>
+                        <a:bodyPr/>
+                        <a:lstStyle/>
+                        <a:p>
+                          <a:endParaRPr lang="es-ES"/>
+                        </a:p>
+                      </a:txBody>
+                      <a:tcPr>
+                        <a:blipFill>
+                          <a:blip r:embed="rId3"/>
+                          <a:stretch>
+                            <a:fillRect l="-200000" t="-9639" r="-100400" b="-528916"/>
+                          </a:stretch>
+                        </a:blipFill>
+                      </a:tcPr>
+                    </a:tc>
+                    <a:tc>
+                      <a:txBody>
+                        <a:bodyPr/>
+                        <a:lstStyle/>
+                        <a:p>
+                          <a:r>
+                            <a:rPr lang="es-ES" dirty="0"/>
+                            <a:t>Prob. be </a:t>
+                          </a:r>
+                          <a:r>
+                            <a:rPr lang="es-ES" dirty="0" err="1"/>
+                            <a:t>efficient</a:t>
+                          </a:r>
+                          <a:endParaRPr lang="es-ES" dirty="0"/>
+                        </a:p>
+                      </a:txBody>
+                      <a:tcPr/>
+                    </a:tc>
+                    <a:extLst>
+                      <a:ext uri="{0D108BD9-81ED-4DB2-BD59-A6C34878D82A}">
+                        <a16:rowId xmlns:a16="http://schemas.microsoft.com/office/drawing/2014/main" val="4092000649"/>
+                      </a:ext>
+                    </a:extLst>
+                  </a:tr>
+                  <a:tr h="502920">
+                    <a:tc>
+                      <a:txBody>
+                        <a:bodyPr/>
+                        <a:lstStyle/>
+                        <a:p>
+                          <a:r>
+                            <a:rPr lang="es-ES" dirty="0"/>
+                            <a:t>1</a:t>
+                          </a:r>
+                        </a:p>
+                      </a:txBody>
+                      <a:tcPr/>
+                    </a:tc>
+                    <a:tc>
+                      <a:txBody>
+                        <a:bodyPr/>
+                        <a:lstStyle/>
+                        <a:p>
+                          <a:pPr algn="ctr"/>
+                          <a:r>
+                            <a:rPr lang="es-ES" dirty="0"/>
+                            <a:t>1.009995</a:t>
+                          </a:r>
+                        </a:p>
+                      </a:txBody>
+                      <a:tcPr/>
+                    </a:tc>
+                    <a:tc>
+                      <a:txBody>
+                        <a:bodyPr/>
+                        <a:lstStyle/>
+                        <a:p>
+                          <a:pPr algn="ctr"/>
+                          <a:r>
+                            <a:rPr lang="es-ES" dirty="0"/>
+                            <a:t>4.606</a:t>
+                          </a:r>
+                        </a:p>
+                      </a:txBody>
+                      <a:tcPr/>
+                    </a:tc>
+                    <a:tc>
+                      <a:txBody>
+                        <a:bodyPr/>
+                        <a:lstStyle/>
+                        <a:p>
+                          <a:pPr algn="ctr"/>
+                          <a:r>
+                            <a:rPr lang="es-ES" dirty="0"/>
+                            <a:t>0.96</a:t>
+                          </a:r>
+                        </a:p>
+                      </a:txBody>
+                      <a:tcPr/>
+                    </a:tc>
+                    <a:extLst>
+                      <a:ext uri="{0D108BD9-81ED-4DB2-BD59-A6C34878D82A}">
+                        <a16:rowId xmlns:a16="http://schemas.microsoft.com/office/drawing/2014/main" val="187936132"/>
+                      </a:ext>
+                    </a:extLst>
+                  </a:tr>
+                  <a:tr h="502920">
+                    <a:tc>
+                      <a:txBody>
+                        <a:bodyPr/>
+                        <a:lstStyle/>
+                        <a:p>
+                          <a:r>
+                            <a:rPr lang="es-ES" dirty="0"/>
+                            <a:t>2</a:t>
+                          </a:r>
+                        </a:p>
+                      </a:txBody>
+                      <a:tcPr/>
+                    </a:tc>
+                    <a:tc>
+                      <a:txBody>
+                        <a:bodyPr/>
+                        <a:lstStyle/>
+                        <a:p>
+                          <a:pPr algn="ctr"/>
+                          <a:r>
+                            <a:rPr lang="es-ES" dirty="0"/>
+                            <a:t>3.023767</a:t>
+                          </a:r>
+                        </a:p>
+                      </a:txBody>
+                      <a:tcPr/>
+                    </a:tc>
+                    <a:tc>
+                      <a:txBody>
+                        <a:bodyPr/>
+                        <a:lstStyle/>
+                        <a:p>
+                          <a:pPr algn="ctr"/>
+                          <a:r>
+                            <a:rPr lang="es-ES" dirty="0"/>
+                            <a:t>4.606</a:t>
+                          </a:r>
+                        </a:p>
+                      </a:txBody>
+                      <a:tcPr/>
+                    </a:tc>
+                    <a:tc>
+                      <a:txBody>
+                        <a:bodyPr/>
+                        <a:lstStyle/>
+                        <a:p>
+                          <a:pPr algn="ctr"/>
+                          <a:r>
+                            <a:rPr lang="es-ES" dirty="0"/>
+                            <a:t>0.62</a:t>
+                          </a:r>
+                        </a:p>
+                      </a:txBody>
+                      <a:tcPr/>
+                    </a:tc>
+                    <a:extLst>
+                      <a:ext uri="{0D108BD9-81ED-4DB2-BD59-A6C34878D82A}">
+                        <a16:rowId xmlns:a16="http://schemas.microsoft.com/office/drawing/2014/main" val="2610583558"/>
+                      </a:ext>
+                    </a:extLst>
+                  </a:tr>
+                  <a:tr h="502920">
+                    <a:tc>
+                      <a:txBody>
+                        <a:bodyPr/>
+                        <a:lstStyle/>
+                        <a:p>
+                          <a:r>
+                            <a:rPr lang="es-ES" dirty="0"/>
+                            <a:t>3</a:t>
+                          </a:r>
+                        </a:p>
+                      </a:txBody>
+                      <a:tcPr/>
+                    </a:tc>
+                    <a:tc>
+                      <a:txBody>
+                        <a:bodyPr/>
+                        <a:lstStyle/>
+                        <a:p>
+                          <a:pPr algn="ctr"/>
+                          <a:r>
+                            <a:rPr lang="es-ES" dirty="0"/>
+                            <a:t>5.037538</a:t>
+                          </a:r>
+                        </a:p>
+                      </a:txBody>
+                      <a:tcPr/>
+                    </a:tc>
+                    <a:tc>
+                      <a:txBody>
+                        <a:bodyPr/>
+                        <a:lstStyle/>
+                        <a:p>
+                          <a:pPr algn="ctr"/>
+                          <a:r>
+                            <a:rPr lang="es-ES" dirty="0"/>
+                            <a:t>4.606</a:t>
+                          </a:r>
+                        </a:p>
+                      </a:txBody>
+                      <a:tcPr/>
+                    </a:tc>
+                    <a:tc>
+                      <a:txBody>
+                        <a:bodyPr/>
+                        <a:lstStyle/>
+                        <a:p>
+                          <a:pPr algn="ctr"/>
+                          <a:r>
+                            <a:rPr lang="es-ES" dirty="0"/>
+                            <a:t>0.14</a:t>
+                          </a:r>
+                        </a:p>
+                      </a:txBody>
+                      <a:tcPr/>
+                    </a:tc>
+                    <a:extLst>
+                      <a:ext uri="{0D108BD9-81ED-4DB2-BD59-A6C34878D82A}">
+                        <a16:rowId xmlns:a16="http://schemas.microsoft.com/office/drawing/2014/main" val="3779409085"/>
+                      </a:ext>
+                    </a:extLst>
+                  </a:tr>
+                  <a:tr h="502920">
+                    <a:tc>
+                      <a:txBody>
+                        <a:bodyPr/>
+                        <a:lstStyle/>
+                        <a:p>
+                          <a:r>
+                            <a:rPr lang="es-ES" dirty="0"/>
+                            <a:t>4</a:t>
+                          </a:r>
+                        </a:p>
+                      </a:txBody>
+                      <a:tcPr/>
+                    </a:tc>
+                    <a:tc>
+                      <a:txBody>
+                        <a:bodyPr/>
+                        <a:lstStyle/>
+                        <a:p>
+                          <a:pPr algn="ctr"/>
+                          <a:r>
+                            <a:rPr lang="es-ES" dirty="0"/>
+                            <a:t>7.051310</a:t>
+                          </a:r>
+                        </a:p>
+                      </a:txBody>
+                      <a:tcPr/>
+                    </a:tc>
+                    <a:tc>
+                      <a:txBody>
+                        <a:bodyPr/>
+                        <a:lstStyle/>
+                        <a:p>
+                          <a:pPr algn="ctr"/>
+                          <a:r>
+                            <a:rPr lang="es-ES" dirty="0"/>
+                            <a:t>4.606</a:t>
+                          </a:r>
+                        </a:p>
+                      </a:txBody>
+                      <a:tcPr/>
+                    </a:tc>
+                    <a:tc>
+                      <a:txBody>
+                        <a:bodyPr/>
+                        <a:lstStyle/>
+                        <a:p>
+                          <a:pPr algn="ctr"/>
+                          <a:r>
+                            <a:rPr lang="es-ES" dirty="0"/>
+                            <a:t>0.02</a:t>
+                          </a:r>
+                        </a:p>
+                      </a:txBody>
+                      <a:tcPr/>
+                    </a:tc>
+                    <a:extLst>
+                      <a:ext uri="{0D108BD9-81ED-4DB2-BD59-A6C34878D82A}">
+                        <a16:rowId xmlns:a16="http://schemas.microsoft.com/office/drawing/2014/main" val="1090756739"/>
+                      </a:ext>
+                    </a:extLst>
+                  </a:tr>
+                  <a:tr h="502920">
+                    <a:tc>
+                      <a:txBody>
+                        <a:bodyPr/>
+                        <a:lstStyle/>
+                        <a:p>
+                          <a:r>
+                            <a:rPr lang="es-ES" dirty="0"/>
+                            <a:t>5</a:t>
+                          </a:r>
+                        </a:p>
+                      </a:txBody>
+                      <a:tcPr/>
+                    </a:tc>
+                    <a:tc>
+                      <a:txBody>
+                        <a:bodyPr/>
+                        <a:lstStyle/>
+                        <a:p>
+                          <a:pPr algn="ctr"/>
+                          <a:r>
+                            <a:rPr lang="es-ES" dirty="0"/>
+                            <a:t>9.065082</a:t>
+                          </a:r>
+                        </a:p>
+                      </a:txBody>
+                      <a:tcPr/>
+                    </a:tc>
+                    <a:tc>
+                      <a:txBody>
+                        <a:bodyPr/>
+                        <a:lstStyle/>
+                        <a:p>
+                          <a:pPr algn="ctr"/>
+                          <a:r>
+                            <a:rPr lang="es-ES" dirty="0"/>
+                            <a:t>4.606</a:t>
+                          </a:r>
+                        </a:p>
+                      </a:txBody>
+                      <a:tcPr/>
+                    </a:tc>
+                    <a:tc>
+                      <a:txBody>
+                        <a:bodyPr/>
+                        <a:lstStyle/>
+                        <a:p>
+                          <a:pPr algn="ctr"/>
+                          <a:r>
+                            <a:rPr lang="es-ES" dirty="0"/>
+                            <a:t>0.00</a:t>
+                          </a:r>
+                        </a:p>
+                      </a:txBody>
+                      <a:tcPr/>
+                    </a:tc>
+                    <a:extLst>
+                      <a:ext uri="{0D108BD9-81ED-4DB2-BD59-A6C34878D82A}">
+                        <a16:rowId xmlns:a16="http://schemas.microsoft.com/office/drawing/2014/main" val="183639519"/>
+                      </a:ext>
+                    </a:extLst>
+                  </a:tr>
+                </a:tbl>
+              </a:graphicData>
+            </a:graphic>
+          </p:graphicFrame>
+        </mc:Fallback>
+      </mc:AlternateContent>
+    </p:spTree>
+    <p:extLst>
+      <p:ext uri="{BB962C8B-B14F-4D97-AF65-F5344CB8AC3E}">
+        <p14:creationId xmlns:p14="http://schemas.microsoft.com/office/powerpoint/2010/main" val="2403433448"/>
+      </p:ext>
+    </p:extLst>
+  </p:cSld>
+  <p:clrMapOvr>
+    <a:masterClrMapping/>
+  </p:clrMapOvr>
+</p:sld>
+</file>
+
+<file path=ppt/slides/slide19.xml><?xml version="1.0" encoding="utf-8"?>
 <p:sld xmlns:a="http://schemas.openxmlformats.org/drawingml/2006/main" xmlns:r="http://schemas.openxmlformats.org/officeDocument/2006/relationships" xmlns:p="http://schemas.openxmlformats.org/presentationml/2006/main">
   <p:cSld>
     <p:spTree>
@@ -17716,7 +20008,7 @@
             <a:fld id="{DBFF9636-A71C-488A-89F8-02E08556F10C}" type="slidenum">
               <a:rPr lang="es-ES" smtClean="0"/>
               <a:pPr/>
-              <a:t>17</a:t>
+              <a:t>19</a:t>
             </a:fld>
             <a:endParaRPr lang="es-ES" dirty="0"/>
           </a:p>
@@ -17735,7 +20027,252 @@
 </p:sld>
 </file>
 
-<file path=ppt/slides/slide18.xml><?xml version="1.0" encoding="utf-8"?>
+<file path=ppt/slides/slide2.xml><?xml version="1.0" encoding="utf-8"?>
+<p:sld xmlns:a="http://schemas.openxmlformats.org/drawingml/2006/main" xmlns:r="http://schemas.openxmlformats.org/officeDocument/2006/relationships" xmlns:p="http://schemas.openxmlformats.org/presentationml/2006/main">
+  <p:cSld>
+    <p:spTree>
+      <p:nvGrpSpPr>
+        <p:cNvPr id="1" name=""/>
+        <p:cNvGrpSpPr/>
+        <p:nvPr/>
+      </p:nvGrpSpPr>
+      <p:grpSpPr>
+        <a:xfrm>
+          <a:off x="0" y="0"/>
+          <a:ext cx="0" cy="0"/>
+          <a:chOff x="0" y="0"/>
+          <a:chExt cx="0" cy="0"/>
+        </a:xfrm>
+      </p:grpSpPr>
+      <p:sp>
+        <p:nvSpPr>
+          <p:cNvPr id="2" name="Título 1">
+            <a:extLst>
+              <a:ext uri="{FF2B5EF4-FFF2-40B4-BE49-F238E27FC236}">
+                <a16:creationId xmlns:a16="http://schemas.microsoft.com/office/drawing/2014/main" id="{BFE94856-9D9C-4ED9-90BF-F310B65BA2C7}"/>
+              </a:ext>
+            </a:extLst>
+          </p:cNvPr>
+          <p:cNvSpPr>
+            <a:spLocks noGrp="1"/>
+          </p:cNvSpPr>
+          <p:nvPr>
+            <p:ph type="title"/>
+          </p:nvPr>
+        </p:nvSpPr>
+        <p:spPr/>
+        <p:txBody>
+          <a:bodyPr/>
+          <a:lstStyle/>
+          <a:p>
+            <a:r>
+              <a:rPr lang="en-AU" dirty="0"/>
+              <a:t>Index</a:t>
+            </a:r>
+          </a:p>
+        </p:txBody>
+      </p:sp>
+      <p:sp>
+        <p:nvSpPr>
+          <p:cNvPr id="3" name="Marcador de contenido 2">
+            <a:extLst>
+              <a:ext uri="{FF2B5EF4-FFF2-40B4-BE49-F238E27FC236}">
+                <a16:creationId xmlns:a16="http://schemas.microsoft.com/office/drawing/2014/main" id="{92AD0A21-745E-4A0B-93F3-9909AF99A29B}"/>
+              </a:ext>
+            </a:extLst>
+          </p:cNvPr>
+          <p:cNvSpPr>
+            <a:spLocks noGrp="1"/>
+          </p:cNvSpPr>
+          <p:nvPr>
+            <p:ph idx="1"/>
+          </p:nvPr>
+        </p:nvSpPr>
+        <p:spPr/>
+        <p:txBody>
+          <a:bodyPr anchor="ctr">
+            <a:normAutofit/>
+          </a:bodyPr>
+          <a:lstStyle/>
+          <a:p>
+            <a:pPr>
+              <a:lnSpc>
+                <a:spcPct val="150000"/>
+              </a:lnSpc>
+              <a:spcBef>
+                <a:spcPts val="1200"/>
+              </a:spcBef>
+              <a:spcAft>
+                <a:spcPts val="1200"/>
+              </a:spcAft>
+            </a:pPr>
+            <a:r>
+              <a:rPr lang="en-AU" sz="4800" dirty="0"/>
+              <a:t>Introduction</a:t>
+            </a:r>
+          </a:p>
+          <a:p>
+            <a:pPr>
+              <a:lnSpc>
+                <a:spcPct val="150000"/>
+              </a:lnSpc>
+              <a:spcBef>
+                <a:spcPts val="1200"/>
+              </a:spcBef>
+              <a:spcAft>
+                <a:spcPts val="1200"/>
+              </a:spcAft>
+            </a:pPr>
+            <a:r>
+              <a:rPr lang="en-AU" sz="4800" dirty="0"/>
+              <a:t>Methodology</a:t>
+            </a:r>
+          </a:p>
+          <a:p>
+            <a:pPr>
+              <a:lnSpc>
+                <a:spcPct val="150000"/>
+              </a:lnSpc>
+              <a:spcBef>
+                <a:spcPts val="1200"/>
+              </a:spcBef>
+              <a:spcAft>
+                <a:spcPts val="1200"/>
+              </a:spcAft>
+            </a:pPr>
+            <a:r>
+              <a:rPr lang="en-AU" sz="4800" dirty="0"/>
+              <a:t>An empirical application</a:t>
+            </a:r>
+          </a:p>
+          <a:p>
+            <a:pPr>
+              <a:lnSpc>
+                <a:spcPct val="150000"/>
+              </a:lnSpc>
+              <a:spcBef>
+                <a:spcPts val="1200"/>
+              </a:spcBef>
+              <a:spcAft>
+                <a:spcPts val="1200"/>
+              </a:spcAft>
+            </a:pPr>
+            <a:r>
+              <a:rPr lang="en-AU" sz="4800" dirty="0"/>
+              <a:t>Conclusions</a:t>
+            </a:r>
+          </a:p>
+        </p:txBody>
+      </p:sp>
+      <p:sp>
+        <p:nvSpPr>
+          <p:cNvPr id="4" name="Marcador de pie de página 3">
+            <a:extLst>
+              <a:ext uri="{FF2B5EF4-FFF2-40B4-BE49-F238E27FC236}">
+                <a16:creationId xmlns:a16="http://schemas.microsoft.com/office/drawing/2014/main" id="{5F27C00A-ACDC-4E4A-984A-BDB61556F009}"/>
+              </a:ext>
+            </a:extLst>
+          </p:cNvPr>
+          <p:cNvSpPr>
+            <a:spLocks noGrp="1"/>
+          </p:cNvSpPr>
+          <p:nvPr>
+            <p:ph type="ftr" sz="quarter" idx="11"/>
+          </p:nvPr>
+        </p:nvSpPr>
+        <p:spPr/>
+        <p:txBody>
+          <a:bodyPr/>
+          <a:lstStyle/>
+          <a:p>
+            <a:pPr algn="ctr">
+              <a:lnSpc>
+                <a:spcPct val="150000"/>
+              </a:lnSpc>
+              <a:spcAft>
+                <a:spcPts val="800"/>
+              </a:spcAft>
+            </a:pPr>
+            <a:r>
+              <a:rPr lang="en-US" sz="1800" b="1" kern="100" dirty="0">
+                <a:effectLst/>
+                <a:latin typeface="Times New Roman" panose="02020603050405020304" pitchFamily="18" charset="0"/>
+                <a:ea typeface="Aptos" panose="020B0004020202020204" pitchFamily="34" charset="0"/>
+                <a:cs typeface="Times New Roman" panose="02020603050405020304" pitchFamily="18" charset="0"/>
+              </a:rPr>
+              <a:t>Using sensitivity analysis and visualization techniques to open black box data mining models: a </a:t>
+            </a:r>
+            <a:r>
+              <a:rPr lang="en-US" sz="1800" b="1" kern="100" dirty="0" err="1">
+                <a:effectLst/>
+                <a:latin typeface="Times New Roman" panose="02020603050405020304" pitchFamily="18" charset="0"/>
+                <a:ea typeface="Aptos" panose="020B0004020202020204" pitchFamily="34" charset="0"/>
+                <a:cs typeface="Times New Roman" panose="02020603050405020304" pitchFamily="18" charset="0"/>
+              </a:rPr>
+              <a:t>rminer</a:t>
+            </a:r>
+            <a:r>
+              <a:rPr lang="en-US" sz="1800" b="1" kern="100" dirty="0">
+                <a:effectLst/>
+                <a:latin typeface="Times New Roman" panose="02020603050405020304" pitchFamily="18" charset="0"/>
+                <a:ea typeface="Aptos" panose="020B0004020202020204" pitchFamily="34" charset="0"/>
+                <a:cs typeface="Times New Roman" panose="02020603050405020304" pitchFamily="18" charset="0"/>
+              </a:rPr>
+              <a:t> example</a:t>
+            </a:r>
+            <a:endParaRPr lang="es-ES" sz="1600" kern="100" dirty="0">
+              <a:effectLst/>
+              <a:latin typeface="Times New Roman" panose="02020603050405020304" pitchFamily="18" charset="0"/>
+              <a:ea typeface="Aptos" panose="020B0004020202020204" pitchFamily="34" charset="0"/>
+              <a:cs typeface="Times New Roman" panose="02020603050405020304" pitchFamily="18" charset="0"/>
+            </a:endParaRPr>
+          </a:p>
+        </p:txBody>
+      </p:sp>
+      <p:sp>
+        <p:nvSpPr>
+          <p:cNvPr id="5" name="Marcador de número de diapositiva 4">
+            <a:extLst>
+              <a:ext uri="{FF2B5EF4-FFF2-40B4-BE49-F238E27FC236}">
+                <a16:creationId xmlns:a16="http://schemas.microsoft.com/office/drawing/2014/main" id="{C9FC0917-D875-4A91-9E78-00B68053351E}"/>
+              </a:ext>
+            </a:extLst>
+          </p:cNvPr>
+          <p:cNvSpPr>
+            <a:spLocks noGrp="1"/>
+          </p:cNvSpPr>
+          <p:nvPr>
+            <p:ph type="sldNum" sz="quarter" idx="12"/>
+          </p:nvPr>
+        </p:nvSpPr>
+        <p:spPr/>
+        <p:txBody>
+          <a:bodyPr/>
+          <a:lstStyle/>
+          <a:p>
+            <a:fld id="{DBFF9636-A71C-488A-89F8-02E08556F10C}" type="slidenum">
+              <a:rPr lang="es-ES" smtClean="0"/>
+              <a:pPr/>
+              <a:t>2</a:t>
+            </a:fld>
+            <a:endParaRPr lang="es-ES" dirty="0"/>
+          </a:p>
+        </p:txBody>
+      </p:sp>
+    </p:spTree>
+    <p:extLst>
+      <p:ext uri="{BB962C8B-B14F-4D97-AF65-F5344CB8AC3E}">
+        <p14:creationId xmlns:p14="http://schemas.microsoft.com/office/powerpoint/2010/main" val="392837780"/>
+      </p:ext>
+    </p:extLst>
+  </p:cSld>
+  <p:clrMapOvr>
+    <a:masterClrMapping/>
+  </p:clrMapOvr>
+</p:sld>
+</file>
+
+<file path=ppt/slides/slide20.xml><?xml version="1.0" encoding="utf-8"?>
 <p:sld xmlns:a="http://schemas.openxmlformats.org/drawingml/2006/main" xmlns:r="http://schemas.openxmlformats.org/officeDocument/2006/relationships" xmlns:p="http://schemas.openxmlformats.org/presentationml/2006/main">
   <p:cSld>
     <p:spTree>
@@ -17869,7 +20406,7 @@
             <a:fld id="{DBFF9636-A71C-488A-89F8-02E08556F10C}" type="slidenum">
               <a:rPr lang="es-ES" smtClean="0"/>
               <a:pPr/>
-              <a:t>18</a:t>
+              <a:t>20</a:t>
             </a:fld>
             <a:endParaRPr lang="es-ES" dirty="0"/>
           </a:p>
@@ -22424,7 +24961,7 @@
 </p:sld>
 </file>
 
-<file path=ppt/slides/slide19.xml><?xml version="1.0" encoding="utf-8"?>
+<file path=ppt/slides/slide21.xml><?xml version="1.0" encoding="utf-8"?>
 <p:sld xmlns:a="http://schemas.openxmlformats.org/drawingml/2006/main" xmlns:r="http://schemas.openxmlformats.org/officeDocument/2006/relationships" xmlns:p="http://schemas.openxmlformats.org/presentationml/2006/main">
   <p:cSld>
     <p:spTree>
@@ -22544,7 +25081,7 @@
             <a:fld id="{DBFF9636-A71C-488A-89F8-02E08556F10C}" type="slidenum">
               <a:rPr lang="es-ES" smtClean="0"/>
               <a:pPr/>
-              <a:t>19</a:t>
+              <a:t>21</a:t>
             </a:fld>
             <a:endParaRPr lang="es-ES" dirty="0"/>
           </a:p>
@@ -22563,252 +25100,7 @@
 </p:sld>
 </file>
 
-<file path=ppt/slides/slide2.xml><?xml version="1.0" encoding="utf-8"?>
-<p:sld xmlns:a="http://schemas.openxmlformats.org/drawingml/2006/main" xmlns:r="http://schemas.openxmlformats.org/officeDocument/2006/relationships" xmlns:p="http://schemas.openxmlformats.org/presentationml/2006/main">
-  <p:cSld>
-    <p:spTree>
-      <p:nvGrpSpPr>
-        <p:cNvPr id="1" name=""/>
-        <p:cNvGrpSpPr/>
-        <p:nvPr/>
-      </p:nvGrpSpPr>
-      <p:grpSpPr>
-        <a:xfrm>
-          <a:off x="0" y="0"/>
-          <a:ext cx="0" cy="0"/>
-          <a:chOff x="0" y="0"/>
-          <a:chExt cx="0" cy="0"/>
-        </a:xfrm>
-      </p:grpSpPr>
-      <p:sp>
-        <p:nvSpPr>
-          <p:cNvPr id="2" name="Título 1">
-            <a:extLst>
-              <a:ext uri="{FF2B5EF4-FFF2-40B4-BE49-F238E27FC236}">
-                <a16:creationId xmlns:a16="http://schemas.microsoft.com/office/drawing/2014/main" id="{BFE94856-9D9C-4ED9-90BF-F310B65BA2C7}"/>
-              </a:ext>
-            </a:extLst>
-          </p:cNvPr>
-          <p:cNvSpPr>
-            <a:spLocks noGrp="1"/>
-          </p:cNvSpPr>
-          <p:nvPr>
-            <p:ph type="title"/>
-          </p:nvPr>
-        </p:nvSpPr>
-        <p:spPr/>
-        <p:txBody>
-          <a:bodyPr/>
-          <a:lstStyle/>
-          <a:p>
-            <a:r>
-              <a:rPr lang="en-AU" dirty="0"/>
-              <a:t>Index</a:t>
-            </a:r>
-          </a:p>
-        </p:txBody>
-      </p:sp>
-      <p:sp>
-        <p:nvSpPr>
-          <p:cNvPr id="3" name="Marcador de contenido 2">
-            <a:extLst>
-              <a:ext uri="{FF2B5EF4-FFF2-40B4-BE49-F238E27FC236}">
-                <a16:creationId xmlns:a16="http://schemas.microsoft.com/office/drawing/2014/main" id="{92AD0A21-745E-4A0B-93F3-9909AF99A29B}"/>
-              </a:ext>
-            </a:extLst>
-          </p:cNvPr>
-          <p:cNvSpPr>
-            <a:spLocks noGrp="1"/>
-          </p:cNvSpPr>
-          <p:nvPr>
-            <p:ph idx="1"/>
-          </p:nvPr>
-        </p:nvSpPr>
-        <p:spPr/>
-        <p:txBody>
-          <a:bodyPr anchor="ctr">
-            <a:normAutofit/>
-          </a:bodyPr>
-          <a:lstStyle/>
-          <a:p>
-            <a:pPr>
-              <a:lnSpc>
-                <a:spcPct val="150000"/>
-              </a:lnSpc>
-              <a:spcBef>
-                <a:spcPts val="1200"/>
-              </a:spcBef>
-              <a:spcAft>
-                <a:spcPts val="1200"/>
-              </a:spcAft>
-            </a:pPr>
-            <a:r>
-              <a:rPr lang="en-AU" sz="4800" dirty="0"/>
-              <a:t>Introduction</a:t>
-            </a:r>
-          </a:p>
-          <a:p>
-            <a:pPr>
-              <a:lnSpc>
-                <a:spcPct val="150000"/>
-              </a:lnSpc>
-              <a:spcBef>
-                <a:spcPts val="1200"/>
-              </a:spcBef>
-              <a:spcAft>
-                <a:spcPts val="1200"/>
-              </a:spcAft>
-            </a:pPr>
-            <a:r>
-              <a:rPr lang="en-AU" sz="4800" dirty="0"/>
-              <a:t>Methodology</a:t>
-            </a:r>
-          </a:p>
-          <a:p>
-            <a:pPr>
-              <a:lnSpc>
-                <a:spcPct val="150000"/>
-              </a:lnSpc>
-              <a:spcBef>
-                <a:spcPts val="1200"/>
-              </a:spcBef>
-              <a:spcAft>
-                <a:spcPts val="1200"/>
-              </a:spcAft>
-            </a:pPr>
-            <a:r>
-              <a:rPr lang="en-AU" sz="4800" dirty="0"/>
-              <a:t>An empirical application</a:t>
-            </a:r>
-          </a:p>
-          <a:p>
-            <a:pPr>
-              <a:lnSpc>
-                <a:spcPct val="150000"/>
-              </a:lnSpc>
-              <a:spcBef>
-                <a:spcPts val="1200"/>
-              </a:spcBef>
-              <a:spcAft>
-                <a:spcPts val="1200"/>
-              </a:spcAft>
-            </a:pPr>
-            <a:r>
-              <a:rPr lang="en-AU" sz="4800" dirty="0"/>
-              <a:t>Conclusions</a:t>
-            </a:r>
-          </a:p>
-        </p:txBody>
-      </p:sp>
-      <p:sp>
-        <p:nvSpPr>
-          <p:cNvPr id="4" name="Marcador de pie de página 3">
-            <a:extLst>
-              <a:ext uri="{FF2B5EF4-FFF2-40B4-BE49-F238E27FC236}">
-                <a16:creationId xmlns:a16="http://schemas.microsoft.com/office/drawing/2014/main" id="{5F27C00A-ACDC-4E4A-984A-BDB61556F009}"/>
-              </a:ext>
-            </a:extLst>
-          </p:cNvPr>
-          <p:cNvSpPr>
-            <a:spLocks noGrp="1"/>
-          </p:cNvSpPr>
-          <p:nvPr>
-            <p:ph type="ftr" sz="quarter" idx="11"/>
-          </p:nvPr>
-        </p:nvSpPr>
-        <p:spPr/>
-        <p:txBody>
-          <a:bodyPr/>
-          <a:lstStyle/>
-          <a:p>
-            <a:pPr algn="ctr">
-              <a:lnSpc>
-                <a:spcPct val="150000"/>
-              </a:lnSpc>
-              <a:spcAft>
-                <a:spcPts val="800"/>
-              </a:spcAft>
-            </a:pPr>
-            <a:r>
-              <a:rPr lang="en-US" sz="1800" b="1" kern="100" dirty="0">
-                <a:effectLst/>
-                <a:latin typeface="Times New Roman" panose="02020603050405020304" pitchFamily="18" charset="0"/>
-                <a:ea typeface="Aptos" panose="020B0004020202020204" pitchFamily="34" charset="0"/>
-                <a:cs typeface="Times New Roman" panose="02020603050405020304" pitchFamily="18" charset="0"/>
-              </a:rPr>
-              <a:t>Using sensitivity analysis and visualization techniques to open black box data mining models: a </a:t>
-            </a:r>
-            <a:r>
-              <a:rPr lang="en-US" sz="1800" b="1" kern="100" dirty="0" err="1">
-                <a:effectLst/>
-                <a:latin typeface="Times New Roman" panose="02020603050405020304" pitchFamily="18" charset="0"/>
-                <a:ea typeface="Aptos" panose="020B0004020202020204" pitchFamily="34" charset="0"/>
-                <a:cs typeface="Times New Roman" panose="02020603050405020304" pitchFamily="18" charset="0"/>
-              </a:rPr>
-              <a:t>rminer</a:t>
-            </a:r>
-            <a:r>
-              <a:rPr lang="en-US" sz="1800" b="1" kern="100" dirty="0">
-                <a:effectLst/>
-                <a:latin typeface="Times New Roman" panose="02020603050405020304" pitchFamily="18" charset="0"/>
-                <a:ea typeface="Aptos" panose="020B0004020202020204" pitchFamily="34" charset="0"/>
-                <a:cs typeface="Times New Roman" panose="02020603050405020304" pitchFamily="18" charset="0"/>
-              </a:rPr>
-              <a:t> example</a:t>
-            </a:r>
-            <a:endParaRPr lang="es-ES" sz="1600" kern="100" dirty="0">
-              <a:effectLst/>
-              <a:latin typeface="Times New Roman" panose="02020603050405020304" pitchFamily="18" charset="0"/>
-              <a:ea typeface="Aptos" panose="020B0004020202020204" pitchFamily="34" charset="0"/>
-              <a:cs typeface="Times New Roman" panose="02020603050405020304" pitchFamily="18" charset="0"/>
-            </a:endParaRPr>
-          </a:p>
-        </p:txBody>
-      </p:sp>
-      <p:sp>
-        <p:nvSpPr>
-          <p:cNvPr id="5" name="Marcador de número de diapositiva 4">
-            <a:extLst>
-              <a:ext uri="{FF2B5EF4-FFF2-40B4-BE49-F238E27FC236}">
-                <a16:creationId xmlns:a16="http://schemas.microsoft.com/office/drawing/2014/main" id="{C9FC0917-D875-4A91-9E78-00B68053351E}"/>
-              </a:ext>
-            </a:extLst>
-          </p:cNvPr>
-          <p:cNvSpPr>
-            <a:spLocks noGrp="1"/>
-          </p:cNvSpPr>
-          <p:nvPr>
-            <p:ph type="sldNum" sz="quarter" idx="12"/>
-          </p:nvPr>
-        </p:nvSpPr>
-        <p:spPr/>
-        <p:txBody>
-          <a:bodyPr/>
-          <a:lstStyle/>
-          <a:p>
-            <a:fld id="{DBFF9636-A71C-488A-89F8-02E08556F10C}" type="slidenum">
-              <a:rPr lang="es-ES" smtClean="0"/>
-              <a:pPr/>
-              <a:t>2</a:t>
-            </a:fld>
-            <a:endParaRPr lang="es-ES" dirty="0"/>
-          </a:p>
-        </p:txBody>
-      </p:sp>
-    </p:spTree>
-    <p:extLst>
-      <p:ext uri="{BB962C8B-B14F-4D97-AF65-F5344CB8AC3E}">
-        <p14:creationId xmlns:p14="http://schemas.microsoft.com/office/powerpoint/2010/main" val="392837780"/>
-      </p:ext>
-    </p:extLst>
-  </p:cSld>
-  <p:clrMapOvr>
-    <a:masterClrMapping/>
-  </p:clrMapOvr>
-</p:sld>
-</file>
-
-<file path=ppt/slides/slide20.xml><?xml version="1.0" encoding="utf-8"?>
+<file path=ppt/slides/slide22.xml><?xml version="1.0" encoding="utf-8"?>
 <p:sld xmlns:a="http://schemas.openxmlformats.org/drawingml/2006/main" xmlns:r="http://schemas.openxmlformats.org/officeDocument/2006/relationships" xmlns:p="http://schemas.openxmlformats.org/presentationml/2006/main">
   <p:cSld>
     <p:spTree>
@@ -22969,7 +25261,7 @@
             <a:fld id="{DBFF9636-A71C-488A-89F8-02E08556F10C}" type="slidenum">
               <a:rPr lang="es-ES" smtClean="0"/>
               <a:pPr/>
-              <a:t>20</a:t>
+              <a:t>22</a:t>
             </a:fld>
             <a:endParaRPr lang="es-ES" dirty="0"/>
           </a:p>
@@ -22988,7 +25280,7 @@
 </p:sld>
 </file>
 
-<file path=ppt/slides/slide21.xml><?xml version="1.0" encoding="utf-8"?>
+<file path=ppt/slides/slide23.xml><?xml version="1.0" encoding="utf-8"?>
 <p:sld xmlns:a="http://schemas.openxmlformats.org/drawingml/2006/main" xmlns:r="http://schemas.openxmlformats.org/officeDocument/2006/relationships" xmlns:p="http://schemas.openxmlformats.org/presentationml/2006/main">
   <p:cSld>
     <p:spTree>
@@ -23116,7 +25408,7 @@
             <a:fld id="{DBFF9636-A71C-488A-89F8-02E08556F10C}" type="slidenum">
               <a:rPr lang="es-ES" smtClean="0"/>
               <a:pPr/>
-              <a:t>21</a:t>
+              <a:t>23</a:t>
             </a:fld>
             <a:endParaRPr lang="es-ES" dirty="0"/>
           </a:p>
@@ -23258,7 +25550,7 @@
 </p:sld>
 </file>
 
-<file path=ppt/slides/slide22.xml><?xml version="1.0" encoding="utf-8"?>
+<file path=ppt/slides/slide24.xml><?xml version="1.0" encoding="utf-8"?>
 <p:sld xmlns:a="http://schemas.openxmlformats.org/drawingml/2006/main" xmlns:r="http://schemas.openxmlformats.org/officeDocument/2006/relationships" xmlns:p="http://schemas.openxmlformats.org/presentationml/2006/main">
   <p:cSld>
     <p:spTree>
@@ -23386,7 +25678,7 @@
             <a:fld id="{DBFF9636-A71C-488A-89F8-02E08556F10C}" type="slidenum">
               <a:rPr lang="es-ES" smtClean="0"/>
               <a:pPr/>
-              <a:t>22</a:t>
+              <a:t>24</a:t>
             </a:fld>
             <a:endParaRPr lang="es-ES" dirty="0"/>
           </a:p>
@@ -23885,7 +26177,7 @@
 </p:sld>
 </file>
 
-<file path=ppt/slides/slide23.xml><?xml version="1.0" encoding="utf-8"?>
+<file path=ppt/slides/slide25.xml><?xml version="1.0" encoding="utf-8"?>
 <p:sld xmlns:a="http://schemas.openxmlformats.org/drawingml/2006/main" xmlns:r="http://schemas.openxmlformats.org/officeDocument/2006/relationships" xmlns:p="http://schemas.openxmlformats.org/presentationml/2006/main">
   <p:cSld>
     <p:spTree>
@@ -24013,7 +26305,7 @@
             <a:fld id="{DBFF9636-A71C-488A-89F8-02E08556F10C}" type="slidenum">
               <a:rPr lang="es-ES" smtClean="0"/>
               <a:pPr/>
-              <a:t>23</a:t>
+              <a:t>25</a:t>
             </a:fld>
             <a:endParaRPr lang="es-ES" dirty="0"/>
           </a:p>
@@ -26121,7 +28413,7 @@
 </p:sld>
 </file>
 
-<file path=ppt/slides/slide24.xml><?xml version="1.0" encoding="utf-8"?>
+<file path=ppt/slides/slide26.xml><?xml version="1.0" encoding="utf-8"?>
 <p:sld xmlns:a="http://schemas.openxmlformats.org/drawingml/2006/main" xmlns:r="http://schemas.openxmlformats.org/officeDocument/2006/relationships" xmlns:p="http://schemas.openxmlformats.org/presentationml/2006/main">
   <p:cSld>
     <p:spTree>
@@ -26249,7 +28541,7 @@
             <a:fld id="{DBFF9636-A71C-488A-89F8-02E08556F10C}" type="slidenum">
               <a:rPr lang="es-ES" smtClean="0"/>
               <a:pPr/>
-              <a:t>24</a:t>
+              <a:t>26</a:t>
             </a:fld>
             <a:endParaRPr lang="es-ES" dirty="0"/>
           </a:p>
@@ -26918,7 +29210,7 @@
 </p:sld>
 </file>
 
-<file path=ppt/slides/slide25.xml><?xml version="1.0" encoding="utf-8"?>
+<file path=ppt/slides/slide27.xml><?xml version="1.0" encoding="utf-8"?>
 <p:sld xmlns:a="http://schemas.openxmlformats.org/drawingml/2006/main" xmlns:r="http://schemas.openxmlformats.org/officeDocument/2006/relationships" xmlns:p="http://schemas.openxmlformats.org/presentationml/2006/main">
   <p:cSld>
     <p:spTree>
@@ -27015,7 +29307,7 @@
             <a:fld id="{DBFF9636-A71C-488A-89F8-02E08556F10C}" type="slidenum">
               <a:rPr lang="es-ES" smtClean="0"/>
               <a:pPr/>
-              <a:t>25</a:t>
+              <a:t>27</a:t>
             </a:fld>
             <a:endParaRPr lang="es-ES" dirty="0"/>
           </a:p>
@@ -27086,7 +29378,7 @@
 </p:sld>
 </file>
 
-<file path=ppt/slides/slide26.xml><?xml version="1.0" encoding="utf-8"?>
+<file path=ppt/slides/slide28.xml><?xml version="1.0" encoding="utf-8"?>
 <p:sld xmlns:a="http://schemas.openxmlformats.org/drawingml/2006/main" xmlns:r="http://schemas.openxmlformats.org/officeDocument/2006/relationships" xmlns:p="http://schemas.openxmlformats.org/presentationml/2006/main">
   <p:cSld>
     <p:spTree>
@@ -27155,7 +29447,7 @@
             <a:fld id="{DBFF9636-A71C-488A-89F8-02E08556F10C}" type="slidenum">
               <a:rPr lang="es-ES" smtClean="0"/>
               <a:pPr/>
-              <a:t>26</a:t>
+              <a:t>28</a:t>
             </a:fld>
             <a:endParaRPr lang="es-ES" dirty="0"/>
           </a:p>
@@ -27507,7 +29799,7 @@
 </p:sld>
 </file>
 
-<file path=ppt/slides/slide27.xml><?xml version="1.0" encoding="utf-8"?>
+<file path=ppt/slides/slide29.xml><?xml version="1.0" encoding="utf-8"?>
 <p:sld xmlns:a="http://schemas.openxmlformats.org/drawingml/2006/main" xmlns:r="http://schemas.openxmlformats.org/officeDocument/2006/relationships" xmlns:p="http://schemas.openxmlformats.org/presentationml/2006/main">
   <p:cSld>
     <p:spTree>

</xml_diff>

<commit_message>
mejoras y quitar scores
</commit_message>
<xml_diff>
--- a/articulo 1 XAI/Apuntes/Sensitivity analysis/Presentación SA.pptx
+++ b/articulo 1 XAI/Apuntes/Sensitivity analysis/Presentación SA.pptx
@@ -3065,7 +3065,7 @@
           <a:p>
             <a:fld id="{2DB79FB7-5658-4FB3-B98D-B463C580F970}" type="datetimeFigureOut">
               <a:rPr lang="es-ES" smtClean="0"/>
-              <a:t>21/10/2024</a:t>
+              <a:t>22/10/2024</a:t>
             </a:fld>
             <a:endParaRPr lang="es-ES"/>
           </a:p>
@@ -40112,8 +40112,8 @@
           </a:p>
         </p:txBody>
       </p:sp>
-      <mc:AlternateContent xmlns:mc="http://schemas.openxmlformats.org/markup-compatibility/2006">
-        <mc:Choice xmlns:a14="http://schemas.microsoft.com/office/drawing/2010/main" Requires="a14">
+      <mc:AlternateContent xmlns:mc="http://schemas.openxmlformats.org/markup-compatibility/2006" xmlns:a14="http://schemas.microsoft.com/office/drawing/2010/main">
+        <mc:Choice Requires="a14">
           <p:sp>
             <p:nvSpPr>
               <p:cNvPr id="3" name="Marcador de contenido 2">
@@ -40308,7 +40308,7 @@
             </p:txBody>
           </p:sp>
         </mc:Choice>
-        <mc:Fallback>
+        <mc:Fallback xmlns="">
           <p:sp>
             <p:nvSpPr>
               <p:cNvPr id="3" name="Marcador de contenido 2">
@@ -40506,8 +40506,8 @@
           </a:p>
         </p:txBody>
       </p:sp>
-      <mc:AlternateContent xmlns:mc="http://schemas.openxmlformats.org/markup-compatibility/2006">
-        <mc:Choice xmlns:a14="http://schemas.microsoft.com/office/drawing/2010/main" Requires="a14">
+      <mc:AlternateContent xmlns:mc="http://schemas.openxmlformats.org/markup-compatibility/2006" xmlns:a14="http://schemas.microsoft.com/office/drawing/2010/main">
+        <mc:Choice Requires="a14">
           <p:sp>
             <p:nvSpPr>
               <p:cNvPr id="3" name="Marcador de contenido 2">
@@ -41186,7 +41186,7 @@
             </p:txBody>
           </p:sp>
         </mc:Choice>
-        <mc:Fallback>
+        <mc:Fallback xmlns="">
           <p:sp>
             <p:nvSpPr>
               <p:cNvPr id="3" name="Marcador de contenido 2">
@@ -41384,8 +41384,8 @@
           </a:p>
         </p:txBody>
       </p:sp>
-      <mc:AlternateContent xmlns:mc="http://schemas.openxmlformats.org/markup-compatibility/2006">
-        <mc:Choice xmlns:a14="http://schemas.microsoft.com/office/drawing/2010/main" Requires="a14">
+      <mc:AlternateContent xmlns:mc="http://schemas.openxmlformats.org/markup-compatibility/2006" xmlns:a14="http://schemas.microsoft.com/office/drawing/2010/main">
+        <mc:Choice Requires="a14">
           <p:sp>
             <p:nvSpPr>
               <p:cNvPr id="3" name="Marcador de contenido 2">
@@ -41860,7 +41860,7 @@
             </p:txBody>
           </p:sp>
         </mc:Choice>
-        <mc:Fallback>
+        <mc:Fallback xmlns="">
           <p:sp>
             <p:nvSpPr>
               <p:cNvPr id="3" name="Marcador de contenido 2">
@@ -42058,8 +42058,8 @@
           </a:p>
         </p:txBody>
       </p:sp>
-      <mc:AlternateContent xmlns:mc="http://schemas.openxmlformats.org/markup-compatibility/2006">
-        <mc:Choice xmlns:a14="http://schemas.microsoft.com/office/drawing/2010/main" Requires="a14">
+      <mc:AlternateContent xmlns:mc="http://schemas.openxmlformats.org/markup-compatibility/2006" xmlns:a14="http://schemas.microsoft.com/office/drawing/2010/main">
+        <mc:Choice Requires="a14">
           <p:sp>
             <p:nvSpPr>
               <p:cNvPr id="3" name="Marcador de contenido 2">
@@ -42338,7 +42338,7 @@
             </p:txBody>
           </p:sp>
         </mc:Choice>
-        <mc:Fallback>
+        <mc:Fallback xmlns="">
           <p:sp>
             <p:nvSpPr>
               <p:cNvPr id="3" name="Marcador de contenido 2">
@@ -42536,8 +42536,8 @@
           </a:p>
         </p:txBody>
       </p:sp>
-      <mc:AlternateContent xmlns:mc="http://schemas.openxmlformats.org/markup-compatibility/2006">
-        <mc:Choice xmlns:a14="http://schemas.microsoft.com/office/drawing/2010/main" Requires="a14">
+      <mc:AlternateContent xmlns:mc="http://schemas.openxmlformats.org/markup-compatibility/2006" xmlns:a14="http://schemas.microsoft.com/office/drawing/2010/main">
+        <mc:Choice Requires="a14">
           <p:sp>
             <p:nvSpPr>
               <p:cNvPr id="3" name="Marcador de contenido 2">
@@ -43132,7 +43132,7 @@
             </p:txBody>
           </p:sp>
         </mc:Choice>
-        <mc:Fallback>
+        <mc:Fallback xmlns="">
           <p:sp>
             <p:nvSpPr>
               <p:cNvPr id="3" name="Marcador de contenido 2">
@@ -43692,8 +43692,8 @@
           </a:prstGeom>
         </p:spPr>
       </p:pic>
-      <mc:AlternateContent xmlns:mc="http://schemas.openxmlformats.org/markup-compatibility/2006">
-        <mc:Choice xmlns:a14="http://schemas.microsoft.com/office/drawing/2010/main" Requires="a14">
+      <mc:AlternateContent xmlns:mc="http://schemas.openxmlformats.org/markup-compatibility/2006" xmlns:a14="http://schemas.microsoft.com/office/drawing/2010/main">
+        <mc:Choice Requires="a14">
           <p:sp>
             <p:nvSpPr>
               <p:cNvPr id="9" name="CuadroTexto 8">
@@ -44128,7 +44128,7 @@
             </p:txBody>
           </p:sp>
         </mc:Choice>
-        <mc:Fallback>
+        <mc:Fallback xmlns="">
           <p:sp>
             <p:nvSpPr>
               <p:cNvPr id="9" name="CuadroTexto 8">
@@ -44236,8 +44236,8 @@
           </a:p>
         </p:txBody>
       </p:sp>
-      <mc:AlternateContent xmlns:mc="http://schemas.openxmlformats.org/markup-compatibility/2006">
-        <mc:Choice xmlns:a14="http://schemas.microsoft.com/office/drawing/2010/main" Requires="a14">
+      <mc:AlternateContent xmlns:mc="http://schemas.openxmlformats.org/markup-compatibility/2006" xmlns:a14="http://schemas.microsoft.com/office/drawing/2010/main">
+        <mc:Choice Requires="a14">
           <p:sp>
             <p:nvSpPr>
               <p:cNvPr id="3" name="Marcador de contenido 2">
@@ -44909,7 +44909,7 @@
             </p:txBody>
           </p:sp>
         </mc:Choice>
-        <mc:Fallback>
+        <mc:Fallback xmlns="">
           <p:sp>
             <p:nvSpPr>
               <p:cNvPr id="3" name="Marcador de contenido 2">
@@ -45061,14 +45061,14 @@
               <p:nvPr>
                 <p:extLst>
                   <p:ext uri="{D42A27DB-BD31-4B8C-83A1-F6EECF244321}">
-                    <p14:modId xmlns:p14="http://schemas.microsoft.com/office/powerpoint/2010/main" val="3893415664"/>
+                    <p14:modId xmlns:p14="http://schemas.microsoft.com/office/powerpoint/2010/main" val="1705541522"/>
                   </p:ext>
                 </p:extLst>
               </p:nvPr>
             </p:nvGraphicFramePr>
             <p:xfrm>
-              <a:off x="2959100" y="7722394"/>
-              <a:ext cx="12192000" cy="1309180"/>
+              <a:off x="2305210" y="7722394"/>
+              <a:ext cx="12845890" cy="1295019"/>
             </p:xfrm>
             <a:graphic>
               <a:graphicData uri="http://schemas.openxmlformats.org/drawingml/2006/table">
@@ -45077,14 +45077,14 @@
                     <a:tableStyleId>{2D5ABB26-0587-4C30-8999-92F81FD0307C}</a:tableStyleId>
                   </a:tblPr>
                   <a:tblGrid>
-                    <a:gridCol w="6096000">
+                    <a:gridCol w="6422945">
                       <a:extLst>
                         <a:ext uri="{9D8B030D-6E8A-4147-A177-3AD203B41FA5}">
                           <a16:colId xmlns:a16="http://schemas.microsoft.com/office/drawing/2014/main" val="112387607"/>
                         </a:ext>
                       </a:extLst>
                     </a:gridCol>
-                    <a:gridCol w="6096000">
+                    <a:gridCol w="6422945">
                       <a:extLst>
                         <a:ext uri="{9D8B030D-6E8A-4147-A177-3AD203B41FA5}">
                           <a16:colId xmlns:a16="http://schemas.microsoft.com/office/drawing/2014/main" val="4264648445"/>
@@ -45098,6 +45098,7 @@
                         <a:bodyPr/>
                         <a:lstStyle/>
                         <a:p>
+                          <a:pPr/>
                           <a14:m>
                             <m:oMathPara xmlns:m="http://schemas.openxmlformats.org/officeDocument/2006/math">
                               <m:oMathParaPr>
@@ -45107,12 +45108,16 @@
                                 <m:sSub>
                                   <m:sSubPr>
                                     <m:ctrlPr>
-                                      <a:rPr lang="en-US" smtClean="0"/>
+                                      <a:rPr lang="en-US" i="1" smtClean="0">
+                                        <a:latin typeface="Cambria Math" panose="02040503050406030204" pitchFamily="18" charset="0"/>
+                                      </a:rPr>
                                     </m:ctrlPr>
                                   </m:sSubPr>
                                   <m:e>
                                     <m:r>
-                                      <a:rPr lang="en-US"/>
+                                      <a:rPr lang="en-US">
+                                        <a:latin typeface="Cambria Math" panose="02040503050406030204" pitchFamily="18" charset="0"/>
+                                      </a:rPr>
                                       <m:t>𝜍</m:t>
                                     </m:r>
                                   </m:e>
@@ -45132,7 +45137,9 @@
                                   </m:sub>
                                 </m:sSub>
                                 <m:r>
-                                  <a:rPr lang="es-ES" b="0" smtClean="0"/>
+                                  <a:rPr lang="es-ES" b="0" smtClean="0">
+                                    <a:latin typeface="Cambria Math" panose="02040503050406030204" pitchFamily="18" charset="0"/>
+                                  </a:rPr>
                                   <m:t>=</m:t>
                                 </m:r>
                                 <m:r>
@@ -45194,7 +45201,9 @@
                                   <m:fPr>
                                     <m:type m:val="lin"/>
                                     <m:ctrlPr>
-                                      <a:rPr lang="es-ES" b="0" smtClean="0"/>
+                                      <a:rPr lang="es-ES" b="0" i="1" smtClean="0">
+                                        <a:latin typeface="Cambria Math" panose="02040503050406030204" pitchFamily="18" charset="0"/>
+                                      </a:rPr>
                                     </m:ctrlPr>
                                   </m:fPr>
                                   <m:num>
@@ -45202,7 +45211,9 @@
                                       <m:naryPr>
                                         <m:chr m:val="∑"/>
                                         <m:ctrlPr>
-                                          <a:rPr lang="es-ES"/>
+                                          <a:rPr lang="es-ES" i="1">
+                                            <a:latin typeface="Cambria Math" panose="02040503050406030204" pitchFamily="18" charset="0"/>
+                                          </a:rPr>
                                         </m:ctrlPr>
                                       </m:naryPr>
                                       <m:sub>
@@ -45210,17 +45221,23 @@
                                           <m:rPr>
                                             <m:brk m:alnAt="23"/>
                                           </m:rPr>
-                                          <a:rPr lang="es-ES"/>
+                                          <a:rPr lang="es-ES">
+                                            <a:latin typeface="Cambria Math" panose="02040503050406030204" pitchFamily="18" charset="0"/>
+                                          </a:rPr>
                                           <m:t>𝑖</m:t>
                                         </m:r>
                                         <m:r>
-                                          <a:rPr lang="es-ES"/>
+                                          <a:rPr lang="es-ES">
+                                            <a:latin typeface="Cambria Math" panose="02040503050406030204" pitchFamily="18" charset="0"/>
+                                          </a:rPr>
                                           <m:t>=1</m:t>
                                         </m:r>
                                       </m:sub>
                                       <m:sup>
                                         <m:r>
-                                          <a:rPr lang="es-ES"/>
+                                          <a:rPr lang="es-ES">
+                                            <a:latin typeface="Cambria Math" panose="02040503050406030204" pitchFamily="18" charset="0"/>
+                                          </a:rPr>
                                           <m:t>𝐿</m:t>
                                         </m:r>
                                       </m:sup>
@@ -45229,7 +45246,9 @@
                                           <m:naryPr>
                                             <m:chr m:val="∑"/>
                                             <m:ctrlPr>
-                                              <a:rPr lang="es-ES"/>
+                                              <a:rPr lang="es-ES" i="1">
+                                                <a:latin typeface="Cambria Math" panose="02040503050406030204" pitchFamily="18" charset="0"/>
+                                              </a:rPr>
                                             </m:ctrlPr>
                                           </m:naryPr>
                                           <m:sub>
@@ -45237,17 +45256,23 @@
                                               <m:rPr>
                                                 <m:brk m:alnAt="23"/>
                                               </m:rPr>
-                                              <a:rPr lang="es-ES"/>
+                                              <a:rPr lang="es-ES">
+                                                <a:latin typeface="Cambria Math" panose="02040503050406030204" pitchFamily="18" charset="0"/>
+                                              </a:rPr>
                                               <m:t>𝑗</m:t>
                                             </m:r>
                                             <m:r>
-                                              <a:rPr lang="es-ES"/>
+                                              <a:rPr lang="es-ES">
+                                                <a:latin typeface="Cambria Math" panose="02040503050406030204" pitchFamily="18" charset="0"/>
+                                              </a:rPr>
                                               <m:t>=1</m:t>
                                             </m:r>
                                           </m:sub>
                                           <m:sup>
                                             <m:r>
-                                              <a:rPr lang="es-ES"/>
+                                              <a:rPr lang="es-ES">
+                                                <a:latin typeface="Cambria Math" panose="02040503050406030204" pitchFamily="18" charset="0"/>
+                                              </a:rPr>
                                               <m:t>𝐿</m:t>
                                             </m:r>
                                           </m:sup>
@@ -45257,14 +45282,18 @@
                                                 <m:begChr m:val="|"/>
                                                 <m:endChr m:val="|"/>
                                                 <m:ctrlPr>
-                                                  <a:rPr lang="es-ES"/>
+                                                  <a:rPr lang="es-ES" i="1">
+                                                    <a:latin typeface="Cambria Math" panose="02040503050406030204" pitchFamily="18" charset="0"/>
+                                                  </a:rPr>
                                                 </m:ctrlPr>
                                               </m:dPr>
                                               <m:e>
                                                 <m:sSub>
                                                   <m:sSubPr>
                                                     <m:ctrlPr>
-                                                      <a:rPr lang="en-US"/>
+                                                      <a:rPr lang="en-US" i="1">
+                                                        <a:latin typeface="Cambria Math" panose="02040503050406030204" pitchFamily="18" charset="0"/>
+                                                      </a:rPr>
                                                     </m:ctrlPr>
                                                   </m:sSubPr>
                                                   <m:e>
@@ -45272,12 +45301,16 @@
                                                       <m:accPr>
                                                         <m:chr m:val="̂"/>
                                                         <m:ctrlPr>
-                                                          <a:rPr lang="en-US"/>
+                                                          <a:rPr lang="en-US" i="1">
+                                                            <a:latin typeface="Cambria Math" panose="02040503050406030204" pitchFamily="18" charset="0"/>
+                                                          </a:rPr>
                                                         </m:ctrlPr>
                                                       </m:accPr>
                                                       <m:e>
                                                         <m:r>
-                                                          <a:rPr lang="es-ES"/>
+                                                          <a:rPr lang="es-ES">
+                                                            <a:latin typeface="Cambria Math" panose="02040503050406030204" pitchFamily="18" charset="0"/>
+                                                          </a:rPr>
                                                           <m:t>𝑦</m:t>
                                                         </m:r>
                                                       </m:e>
@@ -45287,14 +45320,18 @@
                                                     <m:d>
                                                       <m:dPr>
                                                         <m:ctrlPr>
-                                                          <a:rPr lang="es-ES"/>
+                                                          <a:rPr lang="es-ES" i="1">
+                                                            <a:latin typeface="Cambria Math" panose="02040503050406030204" pitchFamily="18" charset="0"/>
+                                                          </a:rPr>
                                                         </m:ctrlPr>
                                                       </m:dPr>
                                                       <m:e>
                                                         <m:sSub>
                                                           <m:sSubPr>
                                                             <m:ctrlPr>
-                                                              <a:rPr lang="en-US"/>
+                                                              <a:rPr lang="en-US" i="1">
+                                                                <a:latin typeface="Cambria Math" panose="02040503050406030204" pitchFamily="18" charset="0"/>
+                                                              </a:rPr>
                                                             </m:ctrlPr>
                                                           </m:sSubPr>
                                                           <m:e>
@@ -45313,19 +45350,25 @@
                                                           </m:e>
                                                           <m:sub>
                                                             <m:r>
-                                                              <a:rPr lang="es-ES"/>
+                                                              <a:rPr lang="es-ES">
+                                                                <a:latin typeface="Cambria Math" panose="02040503050406030204" pitchFamily="18" charset="0"/>
+                                                              </a:rPr>
                                                               <m:t>𝑖</m:t>
                                                             </m:r>
                                                           </m:sub>
                                                         </m:sSub>
                                                         <m:r>
-                                                          <a:rPr lang="es-ES"/>
+                                                          <a:rPr lang="es-ES">
+                                                            <a:latin typeface="Cambria Math" panose="02040503050406030204" pitchFamily="18" charset="0"/>
+                                                          </a:rPr>
                                                           <m:t>,</m:t>
                                                         </m:r>
                                                         <m:sSub>
                                                           <m:sSubPr>
                                                             <m:ctrlPr>
-                                                              <a:rPr lang="en-US"/>
+                                                              <a:rPr lang="en-US" i="1">
+                                                                <a:latin typeface="Cambria Math" panose="02040503050406030204" pitchFamily="18" charset="0"/>
+                                                              </a:rPr>
                                                             </m:ctrlPr>
                                                           </m:sSubPr>
                                                           <m:e>
@@ -45338,7 +45381,9 @@
                                                           </m:e>
                                                           <m:sub>
                                                             <m:r>
-                                                              <a:rPr lang="es-ES"/>
+                                                              <a:rPr lang="es-ES">
+                                                                <a:latin typeface="Cambria Math" panose="02040503050406030204" pitchFamily="18" charset="0"/>
+                                                              </a:rPr>
                                                               <m:t>𝑗</m:t>
                                                             </m:r>
                                                           </m:sub>
@@ -45348,13 +45393,17 @@
                                                   </m:sub>
                                                 </m:sSub>
                                                 <m:r>
-                                                  <a:rPr lang="es-ES"/>
+                                                  <a:rPr lang="es-ES">
+                                                    <a:latin typeface="Cambria Math" panose="02040503050406030204" pitchFamily="18" charset="0"/>
+                                                  </a:rPr>
                                                   <m:t>−</m:t>
                                                 </m:r>
                                                 <m:sSub>
                                                   <m:sSubPr>
                                                     <m:ctrlPr>
-                                                      <a:rPr lang="es-ES"/>
+                                                      <a:rPr lang="es-ES" i="1">
+                                                        <a:latin typeface="Cambria Math" panose="02040503050406030204" pitchFamily="18" charset="0"/>
+                                                      </a:rPr>
                                                     </m:ctrlPr>
                                                   </m:sSubPr>
                                                   <m:e>
@@ -45362,12 +45411,16 @@
                                                       <m:accPr>
                                                         <m:chr m:val="̃"/>
                                                         <m:ctrlPr>
-                                                          <a:rPr lang="es-ES"/>
+                                                          <a:rPr lang="es-ES" i="1">
+                                                            <a:latin typeface="Cambria Math" panose="02040503050406030204" pitchFamily="18" charset="0"/>
+                                                          </a:rPr>
                                                         </m:ctrlPr>
                                                       </m:accPr>
                                                       <m:e>
                                                         <m:r>
-                                                          <a:rPr lang="es-ES"/>
+                                                          <a:rPr lang="es-ES">
+                                                            <a:latin typeface="Cambria Math" panose="02040503050406030204" pitchFamily="18" charset="0"/>
+                                                          </a:rPr>
                                                           <m:t>𝑦</m:t>
                                                         </m:r>
                                                       </m:e>
@@ -45377,7 +45430,9 @@
                                                     <m:sSub>
                                                       <m:sSubPr>
                                                         <m:ctrlPr>
-                                                          <a:rPr lang="es-ES" smtClean="0"/>
+                                                          <a:rPr lang="es-ES" i="1" smtClean="0">
+                                                            <a:latin typeface="Cambria Math" panose="02040503050406030204" pitchFamily="18" charset="0"/>
+                                                          </a:rPr>
                                                         </m:ctrlPr>
                                                       </m:sSubPr>
                                                       <m:e>
@@ -45396,7 +45451,9 @@
                                                       </m:e>
                                                       <m:sub>
                                                         <m:r>
-                                                          <a:rPr lang="es-ES" b="0" smtClean="0"/>
+                                                          <a:rPr lang="es-ES" b="0" smtClean="0">
+                                                            <a:latin typeface="Cambria Math" panose="02040503050406030204" pitchFamily="18" charset="0"/>
+                                                          </a:rPr>
                                                           <m:t>𝑖</m:t>
                                                         </m:r>
                                                       </m:sub>
@@ -45412,7 +45469,9 @@
                                   </m:num>
                                   <m:den>
                                     <m:r>
-                                      <a:rPr lang="es-ES" b="0" smtClean="0"/>
+                                      <a:rPr lang="es-ES" b="0" smtClean="0">
+                                        <a:latin typeface="Cambria Math" panose="02040503050406030204" pitchFamily="18" charset="0"/>
+                                      </a:rPr>
                                       <m:t>𝐿</m:t>
                                     </m:r>
                                   </m:den>
@@ -45466,12 +45525,16 @@
                                 <m:sSub>
                                   <m:sSubPr>
                                     <m:ctrlPr>
-                                      <a:rPr lang="en-US" smtClean="0"/>
+                                      <a:rPr lang="en-US" i="1" smtClean="0">
+                                        <a:latin typeface="Cambria Math" panose="02040503050406030204" pitchFamily="18" charset="0"/>
+                                      </a:rPr>
                                     </m:ctrlPr>
                                   </m:sSubPr>
                                   <m:e>
                                     <m:r>
-                                      <a:rPr lang="en-US"/>
+                                      <a:rPr lang="en-US">
+                                        <a:latin typeface="Cambria Math" panose="02040503050406030204" pitchFamily="18" charset="0"/>
+                                      </a:rPr>
                                       <m:t>𝜍</m:t>
                                     </m:r>
                                   </m:e>
@@ -45485,7 +45548,9 @@
                                   </m:sub>
                                 </m:sSub>
                                 <m:r>
-                                  <a:rPr lang="es-ES" b="0" smtClean="0"/>
+                                  <a:rPr lang="es-ES" b="0" smtClean="0">
+                                    <a:latin typeface="Cambria Math" panose="02040503050406030204" pitchFamily="18" charset="0"/>
+                                  </a:rPr>
                                   <m:t>=</m:t>
                                 </m:r>
                                 <m:r>
@@ -45541,7 +45606,9 @@
                                   <m:fPr>
                                     <m:type m:val="lin"/>
                                     <m:ctrlPr>
-                                      <a:rPr lang="es-ES" b="0" smtClean="0"/>
+                                      <a:rPr lang="es-ES" b="0" i="1" smtClean="0">
+                                        <a:latin typeface="Cambria Math" panose="02040503050406030204" pitchFamily="18" charset="0"/>
+                                      </a:rPr>
                                     </m:ctrlPr>
                                   </m:fPr>
                                   <m:num>
@@ -45549,7 +45616,9 @@
                                       <m:naryPr>
                                         <m:chr m:val="∑"/>
                                         <m:ctrlPr>
-                                          <a:rPr lang="es-ES"/>
+                                          <a:rPr lang="es-ES" i="1">
+                                            <a:latin typeface="Cambria Math" panose="02040503050406030204" pitchFamily="18" charset="0"/>
+                                          </a:rPr>
                                         </m:ctrlPr>
                                       </m:naryPr>
                                       <m:sub>
@@ -45557,17 +45626,23 @@
                                           <m:rPr>
                                             <m:brk m:alnAt="23"/>
                                           </m:rPr>
-                                          <a:rPr lang="es-ES"/>
+                                          <a:rPr lang="es-ES">
+                                            <a:latin typeface="Cambria Math" panose="02040503050406030204" pitchFamily="18" charset="0"/>
+                                          </a:rPr>
                                           <m:t>𝑖</m:t>
                                         </m:r>
                                         <m:r>
-                                          <a:rPr lang="es-ES"/>
+                                          <a:rPr lang="es-ES">
+                                            <a:latin typeface="Cambria Math" panose="02040503050406030204" pitchFamily="18" charset="0"/>
+                                          </a:rPr>
                                           <m:t>=1</m:t>
                                         </m:r>
                                       </m:sub>
                                       <m:sup>
                                         <m:r>
-                                          <a:rPr lang="es-ES"/>
+                                          <a:rPr lang="es-ES">
+                                            <a:latin typeface="Cambria Math" panose="02040503050406030204" pitchFamily="18" charset="0"/>
+                                          </a:rPr>
                                           <m:t>𝐿</m:t>
                                         </m:r>
                                       </m:sup>
@@ -45576,7 +45651,9 @@
                                           <m:naryPr>
                                             <m:chr m:val="∑"/>
                                             <m:ctrlPr>
-                                              <a:rPr lang="es-ES"/>
+                                              <a:rPr lang="es-ES" i="1">
+                                                <a:latin typeface="Cambria Math" panose="02040503050406030204" pitchFamily="18" charset="0"/>
+                                              </a:rPr>
                                             </m:ctrlPr>
                                           </m:naryPr>
                                           <m:sub>
@@ -45584,17 +45661,23 @@
                                               <m:rPr>
                                                 <m:brk m:alnAt="23"/>
                                               </m:rPr>
-                                              <a:rPr lang="es-ES"/>
+                                              <a:rPr lang="es-ES">
+                                                <a:latin typeface="Cambria Math" panose="02040503050406030204" pitchFamily="18" charset="0"/>
+                                              </a:rPr>
                                               <m:t>𝑗</m:t>
                                             </m:r>
                                             <m:r>
-                                              <a:rPr lang="es-ES"/>
+                                              <a:rPr lang="es-ES">
+                                                <a:latin typeface="Cambria Math" panose="02040503050406030204" pitchFamily="18" charset="0"/>
+                                              </a:rPr>
                                               <m:t>=1</m:t>
                                             </m:r>
                                           </m:sub>
                                           <m:sup>
                                             <m:r>
-                                              <a:rPr lang="es-ES"/>
+                                              <a:rPr lang="es-ES">
+                                                <a:latin typeface="Cambria Math" panose="02040503050406030204" pitchFamily="18" charset="0"/>
+                                              </a:rPr>
                                               <m:t>𝐿</m:t>
                                             </m:r>
                                           </m:sup>
@@ -45604,14 +45687,18 @@
                                                 <m:begChr m:val="|"/>
                                                 <m:endChr m:val="|"/>
                                                 <m:ctrlPr>
-                                                  <a:rPr lang="es-ES"/>
+                                                  <a:rPr lang="es-ES" i="1">
+                                                    <a:latin typeface="Cambria Math" panose="02040503050406030204" pitchFamily="18" charset="0"/>
+                                                  </a:rPr>
                                                 </m:ctrlPr>
                                               </m:dPr>
                                               <m:e>
                                                 <m:sSub>
                                                   <m:sSubPr>
                                                     <m:ctrlPr>
-                                                      <a:rPr lang="en-US"/>
+                                                      <a:rPr lang="en-US" i="1">
+                                                        <a:latin typeface="Cambria Math" panose="02040503050406030204" pitchFamily="18" charset="0"/>
+                                                      </a:rPr>
                                                     </m:ctrlPr>
                                                   </m:sSubPr>
                                                   <m:e>
@@ -45619,12 +45706,16 @@
                                                       <m:accPr>
                                                         <m:chr m:val="̂"/>
                                                         <m:ctrlPr>
-                                                          <a:rPr lang="en-US"/>
+                                                          <a:rPr lang="en-US" i="1">
+                                                            <a:latin typeface="Cambria Math" panose="02040503050406030204" pitchFamily="18" charset="0"/>
+                                                          </a:rPr>
                                                         </m:ctrlPr>
                                                       </m:accPr>
                                                       <m:e>
                                                         <m:r>
-                                                          <a:rPr lang="es-ES"/>
+                                                          <a:rPr lang="es-ES">
+                                                            <a:latin typeface="Cambria Math" panose="02040503050406030204" pitchFamily="18" charset="0"/>
+                                                          </a:rPr>
                                                           <m:t>𝑦</m:t>
                                                         </m:r>
                                                       </m:e>
@@ -45634,14 +45725,18 @@
                                                     <m:d>
                                                       <m:dPr>
                                                         <m:ctrlPr>
-                                                          <a:rPr lang="es-ES"/>
+                                                          <a:rPr lang="es-ES" i="1">
+                                                            <a:latin typeface="Cambria Math" panose="02040503050406030204" pitchFamily="18" charset="0"/>
+                                                          </a:rPr>
                                                         </m:ctrlPr>
                                                       </m:dPr>
                                                       <m:e>
                                                         <m:sSub>
                                                           <m:sSubPr>
                                                             <m:ctrlPr>
-                                                              <a:rPr lang="en-US"/>
+                                                              <a:rPr lang="en-US" i="1">
+                                                                <a:latin typeface="Cambria Math" panose="02040503050406030204" pitchFamily="18" charset="0"/>
+                                                              </a:rPr>
                                                             </m:ctrlPr>
                                                           </m:sSubPr>
                                                           <m:e>
@@ -45660,19 +45755,25 @@
                                                           </m:e>
                                                           <m:sub>
                                                             <m:r>
-                                                              <a:rPr lang="es-ES"/>
+                                                              <a:rPr lang="es-ES">
+                                                                <a:latin typeface="Cambria Math" panose="02040503050406030204" pitchFamily="18" charset="0"/>
+                                                              </a:rPr>
                                                               <m:t>𝑖</m:t>
                                                             </m:r>
                                                           </m:sub>
                                                         </m:sSub>
                                                         <m:r>
-                                                          <a:rPr lang="es-ES"/>
+                                                          <a:rPr lang="es-ES">
+                                                            <a:latin typeface="Cambria Math" panose="02040503050406030204" pitchFamily="18" charset="0"/>
+                                                          </a:rPr>
                                                           <m:t>,</m:t>
                                                         </m:r>
                                                         <m:sSub>
                                                           <m:sSubPr>
                                                             <m:ctrlPr>
-                                                              <a:rPr lang="en-US"/>
+                                                              <a:rPr lang="en-US" i="1">
+                                                                <a:latin typeface="Cambria Math" panose="02040503050406030204" pitchFamily="18" charset="0"/>
+                                                              </a:rPr>
                                                             </m:ctrlPr>
                                                           </m:sSubPr>
                                                           <m:e>
@@ -45685,7 +45786,9 @@
                                                           </m:e>
                                                           <m:sub>
                                                             <m:r>
-                                                              <a:rPr lang="es-ES"/>
+                                                              <a:rPr lang="es-ES">
+                                                                <a:latin typeface="Cambria Math" panose="02040503050406030204" pitchFamily="18" charset="0"/>
+                                                              </a:rPr>
                                                               <m:t>𝑗</m:t>
                                                             </m:r>
                                                           </m:sub>
@@ -45695,13 +45798,17 @@
                                                   </m:sub>
                                                 </m:sSub>
                                                 <m:r>
-                                                  <a:rPr lang="es-ES"/>
+                                                  <a:rPr lang="es-ES">
+                                                    <a:latin typeface="Cambria Math" panose="02040503050406030204" pitchFamily="18" charset="0"/>
+                                                  </a:rPr>
                                                   <m:t>−</m:t>
                                                 </m:r>
                                                 <m:sSub>
                                                   <m:sSubPr>
                                                     <m:ctrlPr>
-                                                      <a:rPr lang="es-ES"/>
+                                                      <a:rPr lang="es-ES" i="1">
+                                                        <a:latin typeface="Cambria Math" panose="02040503050406030204" pitchFamily="18" charset="0"/>
+                                                      </a:rPr>
                                                     </m:ctrlPr>
                                                   </m:sSubPr>
                                                   <m:e>
@@ -45709,12 +45816,16 @@
                                                       <m:accPr>
                                                         <m:chr m:val="̃"/>
                                                         <m:ctrlPr>
-                                                          <a:rPr lang="es-ES"/>
+                                                          <a:rPr lang="es-ES" i="1">
+                                                            <a:latin typeface="Cambria Math" panose="02040503050406030204" pitchFamily="18" charset="0"/>
+                                                          </a:rPr>
                                                         </m:ctrlPr>
                                                       </m:accPr>
                                                       <m:e>
                                                         <m:r>
-                                                          <a:rPr lang="es-ES"/>
+                                                          <a:rPr lang="es-ES">
+                                                            <a:latin typeface="Cambria Math" panose="02040503050406030204" pitchFamily="18" charset="0"/>
+                                                          </a:rPr>
                                                           <m:t>𝑦</m:t>
                                                         </m:r>
                                                       </m:e>
@@ -45724,7 +45835,9 @@
                                                     <m:sSub>
                                                       <m:sSubPr>
                                                         <m:ctrlPr>
-                                                          <a:rPr lang="es-ES" smtClean="0"/>
+                                                          <a:rPr lang="es-ES" i="1" smtClean="0">
+                                                            <a:latin typeface="Cambria Math" panose="02040503050406030204" pitchFamily="18" charset="0"/>
+                                                          </a:rPr>
                                                         </m:ctrlPr>
                                                       </m:sSubPr>
                                                       <m:e>
@@ -45737,7 +45850,9 @@
                                                       </m:e>
                                                       <m:sub>
                                                         <m:r>
-                                                          <a:rPr lang="es-ES" b="0" smtClean="0"/>
+                                                          <a:rPr lang="es-ES" b="0" smtClean="0">
+                                                            <a:latin typeface="Cambria Math" panose="02040503050406030204" pitchFamily="18" charset="0"/>
+                                                          </a:rPr>
                                                           <m:t>𝑖</m:t>
                                                         </m:r>
                                                       </m:sub>
@@ -45753,7 +45868,9 @@
                                   </m:num>
                                   <m:den>
                                     <m:r>
-                                      <a:rPr lang="es-ES" b="0" smtClean="0"/>
+                                      <a:rPr lang="es-ES" b="0" smtClean="0">
+                                        <a:latin typeface="Cambria Math" panose="02040503050406030204" pitchFamily="18" charset="0"/>
+                                      </a:rPr>
                                       <m:t>𝐿</m:t>
                                     </m:r>
                                   </m:den>
@@ -45803,14 +45920,14 @@
               <p:nvPr>
                 <p:extLst>
                   <p:ext uri="{D42A27DB-BD31-4B8C-83A1-F6EECF244321}">
-                    <p14:modId xmlns:p14="http://schemas.microsoft.com/office/powerpoint/2010/main" val="3893415664"/>
+                    <p14:modId xmlns:p14="http://schemas.microsoft.com/office/powerpoint/2010/main" val="1705541522"/>
                   </p:ext>
                 </p:extLst>
               </p:nvPr>
             </p:nvGraphicFramePr>
             <p:xfrm>
-              <a:off x="2959100" y="7722394"/>
-              <a:ext cx="12192000" cy="1309180"/>
+              <a:off x="2305210" y="7722394"/>
+              <a:ext cx="12845890" cy="1295019"/>
             </p:xfrm>
             <a:graphic>
               <a:graphicData uri="http://schemas.openxmlformats.org/drawingml/2006/table">
@@ -45819,14 +45936,14 @@
                     <a:tableStyleId>{2D5ABB26-0587-4C30-8999-92F81FD0307C}</a:tableStyleId>
                   </a:tblPr>
                   <a:tblGrid>
-                    <a:gridCol w="6096000">
+                    <a:gridCol w="6422945">
                       <a:extLst>
                         <a:ext uri="{9D8B030D-6E8A-4147-A177-3AD203B41FA5}">
                           <a16:colId xmlns:a16="http://schemas.microsoft.com/office/drawing/2014/main" val="112387607"/>
                         </a:ext>
                       </a:extLst>
                     </a:gridCol>
-                    <a:gridCol w="6096000">
+                    <a:gridCol w="6422945">
                       <a:extLst>
                         <a:ext uri="{9D8B030D-6E8A-4147-A177-3AD203B41FA5}">
                           <a16:colId xmlns:a16="http://schemas.microsoft.com/office/drawing/2014/main" val="4264648445"/>
@@ -45834,7 +45951,7 @@
                       </a:extLst>
                     </a:gridCol>
                   </a:tblGrid>
-                  <a:tr h="1309180">
+                  <a:tr h="1295019">
                     <a:tc>
                       <a:txBody>
                         <a:bodyPr/>
@@ -45856,7 +45973,7 @@
                         <a:blipFill>
                           <a:blip r:embed="rId3"/>
                           <a:stretch>
-                            <a:fillRect r="-99900" b="-463"/>
+                            <a:fillRect r="-100000" b="-467"/>
                           </a:stretch>
                         </a:blipFill>
                       </a:tcPr>
@@ -45882,7 +45999,7 @@
                         <a:blipFill>
                           <a:blip r:embed="rId3"/>
                           <a:stretch>
-                            <a:fillRect l="-100100" b="-463"/>
+                            <a:fillRect l="-100000" b="-467"/>
                           </a:stretch>
                         </a:blipFill>
                       </a:tcPr>

</xml_diff>